<commit_message>
control and bringup hw
</commit_message>
<xml_diff>
--- a/Documentation/Images/Mecanum_Images.pptx
+++ b/Documentation/Images/Mecanum_Images.pptx
@@ -10,7 +10,8 @@
     <p:sldId id="263" r:id="rId4"/>
     <p:sldId id="264" r:id="rId5"/>
     <p:sldId id="258" r:id="rId6"/>
-    <p:sldId id="262" r:id="rId7"/>
+    <p:sldId id="265" r:id="rId7"/>
+    <p:sldId id="262" r:id="rId8"/>
   </p:sldIdLst>
   <p:sldSz cx="12192000" cy="6858000"/>
   <p:notesSz cx="6858000" cy="9144000"/>
@@ -120,7 +121,7 @@
 <file path=ppt/revisionInfo.xml><?xml version="1.0" encoding="utf-8"?>
 <p1510:revInfo xmlns:a="http://schemas.openxmlformats.org/drawingml/2006/main" xmlns:r="http://schemas.openxmlformats.org/officeDocument/2006/relationships" xmlns:p1510="http://schemas.microsoft.com/office/powerpoint/2015/10/main">
   <p1510:revLst>
-    <p1510:client id="{0805A078-7DA3-4EFD-9B65-C85F29BB91F1}" v="274" dt="2022-03-29T09:38:43.557"/>
+    <p1510:client id="{F5ACA060-5617-4C2B-9B9E-0FDF112D5DD6}" v="6" dt="2023-07-17T12:18:00.505"/>
   </p1510:revLst>
 </p1510:revInfo>
 </file>
@@ -748,6 +749,77 @@
       </pc:sldChg>
     </pc:docChg>
   </pc:docChgLst>
+  <pc:docChgLst>
+    <pc:chgData name="Dr. Manel Puig i Vidal" userId="0d549d0e-cb25-4ad8-b3a5-db046c349dfe" providerId="ADAL" clId="{F5ACA060-5617-4C2B-9B9E-0FDF112D5DD6}"/>
+    <pc:docChg chg="addSld modSld">
+      <pc:chgData name="Dr. Manel Puig i Vidal" userId="0d549d0e-cb25-4ad8-b3a5-db046c349dfe" providerId="ADAL" clId="{F5ACA060-5617-4C2B-9B9E-0FDF112D5DD6}" dt="2023-07-17T12:17:17.614" v="28" actId="1076"/>
+      <pc:docMkLst>
+        <pc:docMk/>
+      </pc:docMkLst>
+      <pc:sldChg chg="addSp modSp mod">
+        <pc:chgData name="Dr. Manel Puig i Vidal" userId="0d549d0e-cb25-4ad8-b3a5-db046c349dfe" providerId="ADAL" clId="{F5ACA060-5617-4C2B-9B9E-0FDF112D5DD6}" dt="2023-07-17T12:17:17.614" v="28" actId="1076"/>
+        <pc:sldMkLst>
+          <pc:docMk/>
+          <pc:sldMk cId="2967436431" sldId="262"/>
+        </pc:sldMkLst>
+        <pc:spChg chg="mod">
+          <ac:chgData name="Dr. Manel Puig i Vidal" userId="0d549d0e-cb25-4ad8-b3a5-db046c349dfe" providerId="ADAL" clId="{F5ACA060-5617-4C2B-9B9E-0FDF112D5DD6}" dt="2023-07-17T12:15:39.929" v="18" actId="20577"/>
+          <ac:spMkLst>
+            <pc:docMk/>
+            <pc:sldMk cId="2967436431" sldId="262"/>
+            <ac:spMk id="2" creationId="{AB3A1AF0-3ED5-442C-8DF2-A8AD170DB81F}"/>
+          </ac:spMkLst>
+        </pc:spChg>
+        <pc:spChg chg="mod">
+          <ac:chgData name="Dr. Manel Puig i Vidal" userId="0d549d0e-cb25-4ad8-b3a5-db046c349dfe" providerId="ADAL" clId="{F5ACA060-5617-4C2B-9B9E-0FDF112D5DD6}" dt="2023-07-17T12:16:24.302" v="26" actId="1076"/>
+          <ac:spMkLst>
+            <pc:docMk/>
+            <pc:sldMk cId="2967436431" sldId="262"/>
+            <ac:spMk id="28" creationId="{C7B3A669-0D52-43CF-BFD3-9E36671C979A}"/>
+          </ac:spMkLst>
+        </pc:spChg>
+        <pc:spChg chg="mod">
+          <ac:chgData name="Dr. Manel Puig i Vidal" userId="0d549d0e-cb25-4ad8-b3a5-db046c349dfe" providerId="ADAL" clId="{F5ACA060-5617-4C2B-9B9E-0FDF112D5DD6}" dt="2023-07-17T12:17:17.614" v="28" actId="1076"/>
+          <ac:spMkLst>
+            <pc:docMk/>
+            <pc:sldMk cId="2967436431" sldId="262"/>
+            <ac:spMk id="30" creationId="{E0806900-E02C-4F19-9DF4-14F27003E0A9}"/>
+          </ac:spMkLst>
+        </pc:spChg>
+        <pc:picChg chg="add mod ord">
+          <ac:chgData name="Dr. Manel Puig i Vidal" userId="0d549d0e-cb25-4ad8-b3a5-db046c349dfe" providerId="ADAL" clId="{F5ACA060-5617-4C2B-9B9E-0FDF112D5DD6}" dt="2023-07-17T12:13:25.926" v="13" actId="1076"/>
+          <ac:picMkLst>
+            <pc:docMk/>
+            <pc:sldMk cId="2967436431" sldId="262"/>
+            <ac:picMk id="3" creationId="{0578D19B-E215-BAE6-5AB5-A674798648E2}"/>
+          </ac:picMkLst>
+        </pc:picChg>
+      </pc:sldChg>
+      <pc:sldChg chg="addSp modSp new mod">
+        <pc:chgData name="Dr. Manel Puig i Vidal" userId="0d549d0e-cb25-4ad8-b3a5-db046c349dfe" providerId="ADAL" clId="{F5ACA060-5617-4C2B-9B9E-0FDF112D5DD6}" dt="2023-07-17T12:12:42.367" v="7" actId="732"/>
+        <pc:sldMkLst>
+          <pc:docMk/>
+          <pc:sldMk cId="2816021084" sldId="265"/>
+        </pc:sldMkLst>
+        <pc:picChg chg="add mod">
+          <ac:chgData name="Dr. Manel Puig i Vidal" userId="0d549d0e-cb25-4ad8-b3a5-db046c349dfe" providerId="ADAL" clId="{F5ACA060-5617-4C2B-9B9E-0FDF112D5DD6}" dt="2023-07-17T12:12:09.908" v="2" actId="1076"/>
+          <ac:picMkLst>
+            <pc:docMk/>
+            <pc:sldMk cId="2816021084" sldId="265"/>
+            <ac:picMk id="2" creationId="{D5C28000-9400-D594-1C16-C516F0A4E7B6}"/>
+          </ac:picMkLst>
+        </pc:picChg>
+        <pc:picChg chg="add mod modCrop">
+          <ac:chgData name="Dr. Manel Puig i Vidal" userId="0d549d0e-cb25-4ad8-b3a5-db046c349dfe" providerId="ADAL" clId="{F5ACA060-5617-4C2B-9B9E-0FDF112D5DD6}" dt="2023-07-17T12:12:42.367" v="7" actId="732"/>
+          <ac:picMkLst>
+            <pc:docMk/>
+            <pc:sldMk cId="2816021084" sldId="265"/>
+            <ac:picMk id="3" creationId="{BAE887E4-4F3A-65A2-6BB4-D797AD40644A}"/>
+          </ac:picMkLst>
+        </pc:picChg>
+      </pc:sldChg>
+    </pc:docChg>
+  </pc:docChgLst>
 </pc:chgInfo>
 </file>
 
@@ -898,7 +970,7 @@
           <a:p>
             <a:fld id="{1C047EFF-C005-42C2-96C9-4E7CFE047116}" type="datetimeFigureOut">
               <a:rPr lang="es-ES" smtClean="0"/>
-              <a:t>29/03/2022</a:t>
+              <a:t>17/07/2023</a:t>
             </a:fld>
             <a:endParaRPr lang="es-ES"/>
           </a:p>
@@ -952,7 +1024,7 @@
           <a:p>
             <a:fld id="{A4D22831-E02E-4D02-9CB9-6EB6AFEAADDE}" type="slidenum">
               <a:rPr lang="es-ES" smtClean="0"/>
-              <a:t>‹Nº›</a:t>
+              <a:t>‹#›</a:t>
             </a:fld>
             <a:endParaRPr lang="es-ES"/>
           </a:p>
@@ -1096,7 +1168,7 @@
           <a:p>
             <a:fld id="{1C047EFF-C005-42C2-96C9-4E7CFE047116}" type="datetimeFigureOut">
               <a:rPr lang="es-ES" smtClean="0"/>
-              <a:t>29/03/2022</a:t>
+              <a:t>17/07/2023</a:t>
             </a:fld>
             <a:endParaRPr lang="es-ES"/>
           </a:p>
@@ -1150,7 +1222,7 @@
           <a:p>
             <a:fld id="{A4D22831-E02E-4D02-9CB9-6EB6AFEAADDE}" type="slidenum">
               <a:rPr lang="es-ES" smtClean="0"/>
-              <a:t>‹Nº›</a:t>
+              <a:t>‹#›</a:t>
             </a:fld>
             <a:endParaRPr lang="es-ES"/>
           </a:p>
@@ -1304,7 +1376,7 @@
           <a:p>
             <a:fld id="{1C047EFF-C005-42C2-96C9-4E7CFE047116}" type="datetimeFigureOut">
               <a:rPr lang="es-ES" smtClean="0"/>
-              <a:t>29/03/2022</a:t>
+              <a:t>17/07/2023</a:t>
             </a:fld>
             <a:endParaRPr lang="es-ES"/>
           </a:p>
@@ -1358,7 +1430,7 @@
           <a:p>
             <a:fld id="{A4D22831-E02E-4D02-9CB9-6EB6AFEAADDE}" type="slidenum">
               <a:rPr lang="es-ES" smtClean="0"/>
-              <a:t>‹Nº›</a:t>
+              <a:t>‹#›</a:t>
             </a:fld>
             <a:endParaRPr lang="es-ES"/>
           </a:p>
@@ -1502,7 +1574,7 @@
           <a:p>
             <a:fld id="{1C047EFF-C005-42C2-96C9-4E7CFE047116}" type="datetimeFigureOut">
               <a:rPr lang="es-ES" smtClean="0"/>
-              <a:t>29/03/2022</a:t>
+              <a:t>17/07/2023</a:t>
             </a:fld>
             <a:endParaRPr lang="es-ES"/>
           </a:p>
@@ -1556,7 +1628,7 @@
           <a:p>
             <a:fld id="{A4D22831-E02E-4D02-9CB9-6EB6AFEAADDE}" type="slidenum">
               <a:rPr lang="es-ES" smtClean="0"/>
-              <a:t>‹Nº›</a:t>
+              <a:t>‹#›</a:t>
             </a:fld>
             <a:endParaRPr lang="es-ES"/>
           </a:p>
@@ -1777,7 +1849,7 @@
           <a:p>
             <a:fld id="{1C047EFF-C005-42C2-96C9-4E7CFE047116}" type="datetimeFigureOut">
               <a:rPr lang="es-ES" smtClean="0"/>
-              <a:t>29/03/2022</a:t>
+              <a:t>17/07/2023</a:t>
             </a:fld>
             <a:endParaRPr lang="es-ES"/>
           </a:p>
@@ -1831,7 +1903,7 @@
           <a:p>
             <a:fld id="{A4D22831-E02E-4D02-9CB9-6EB6AFEAADDE}" type="slidenum">
               <a:rPr lang="es-ES" smtClean="0"/>
-              <a:t>‹Nº›</a:t>
+              <a:t>‹#›</a:t>
             </a:fld>
             <a:endParaRPr lang="es-ES"/>
           </a:p>
@@ -2042,7 +2114,7 @@
           <a:p>
             <a:fld id="{1C047EFF-C005-42C2-96C9-4E7CFE047116}" type="datetimeFigureOut">
               <a:rPr lang="es-ES" smtClean="0"/>
-              <a:t>29/03/2022</a:t>
+              <a:t>17/07/2023</a:t>
             </a:fld>
             <a:endParaRPr lang="es-ES"/>
           </a:p>
@@ -2096,7 +2168,7 @@
           <a:p>
             <a:fld id="{A4D22831-E02E-4D02-9CB9-6EB6AFEAADDE}" type="slidenum">
               <a:rPr lang="es-ES" smtClean="0"/>
-              <a:t>‹Nº›</a:t>
+              <a:t>‹#›</a:t>
             </a:fld>
             <a:endParaRPr lang="es-ES"/>
           </a:p>
@@ -2454,7 +2526,7 @@
           <a:p>
             <a:fld id="{1C047EFF-C005-42C2-96C9-4E7CFE047116}" type="datetimeFigureOut">
               <a:rPr lang="es-ES" smtClean="0"/>
-              <a:t>29/03/2022</a:t>
+              <a:t>17/07/2023</a:t>
             </a:fld>
             <a:endParaRPr lang="es-ES"/>
           </a:p>
@@ -2508,7 +2580,7 @@
           <a:p>
             <a:fld id="{A4D22831-E02E-4D02-9CB9-6EB6AFEAADDE}" type="slidenum">
               <a:rPr lang="es-ES" smtClean="0"/>
-              <a:t>‹Nº›</a:t>
+              <a:t>‹#›</a:t>
             </a:fld>
             <a:endParaRPr lang="es-ES"/>
           </a:p>
@@ -2595,7 +2667,7 @@
           <a:p>
             <a:fld id="{1C047EFF-C005-42C2-96C9-4E7CFE047116}" type="datetimeFigureOut">
               <a:rPr lang="es-ES" smtClean="0"/>
-              <a:t>29/03/2022</a:t>
+              <a:t>17/07/2023</a:t>
             </a:fld>
             <a:endParaRPr lang="es-ES"/>
           </a:p>
@@ -2649,7 +2721,7 @@
           <a:p>
             <a:fld id="{A4D22831-E02E-4D02-9CB9-6EB6AFEAADDE}" type="slidenum">
               <a:rPr lang="es-ES" smtClean="0"/>
-              <a:t>‹Nº›</a:t>
+              <a:t>‹#›</a:t>
             </a:fld>
             <a:endParaRPr lang="es-ES"/>
           </a:p>
@@ -2708,7 +2780,7 @@
           <a:p>
             <a:fld id="{1C047EFF-C005-42C2-96C9-4E7CFE047116}" type="datetimeFigureOut">
               <a:rPr lang="es-ES" smtClean="0"/>
-              <a:t>29/03/2022</a:t>
+              <a:t>17/07/2023</a:t>
             </a:fld>
             <a:endParaRPr lang="es-ES"/>
           </a:p>
@@ -2762,7 +2834,7 @@
           <a:p>
             <a:fld id="{A4D22831-E02E-4D02-9CB9-6EB6AFEAADDE}" type="slidenum">
               <a:rPr lang="es-ES" smtClean="0"/>
-              <a:t>‹Nº›</a:t>
+              <a:t>‹#›</a:t>
             </a:fld>
             <a:endParaRPr lang="es-ES"/>
           </a:p>
@@ -3019,7 +3091,7 @@
           <a:p>
             <a:fld id="{1C047EFF-C005-42C2-96C9-4E7CFE047116}" type="datetimeFigureOut">
               <a:rPr lang="es-ES" smtClean="0"/>
-              <a:t>29/03/2022</a:t>
+              <a:t>17/07/2023</a:t>
             </a:fld>
             <a:endParaRPr lang="es-ES"/>
           </a:p>
@@ -3073,7 +3145,7 @@
           <a:p>
             <a:fld id="{A4D22831-E02E-4D02-9CB9-6EB6AFEAADDE}" type="slidenum">
               <a:rPr lang="es-ES" smtClean="0"/>
-              <a:t>‹Nº›</a:t>
+              <a:t>‹#›</a:t>
             </a:fld>
             <a:endParaRPr lang="es-ES"/>
           </a:p>
@@ -3307,7 +3379,7 @@
           <a:p>
             <a:fld id="{1C047EFF-C005-42C2-96C9-4E7CFE047116}" type="datetimeFigureOut">
               <a:rPr lang="es-ES" smtClean="0"/>
-              <a:t>29/03/2022</a:t>
+              <a:t>17/07/2023</a:t>
             </a:fld>
             <a:endParaRPr lang="es-ES"/>
           </a:p>
@@ -3361,7 +3433,7 @@
           <a:p>
             <a:fld id="{A4D22831-E02E-4D02-9CB9-6EB6AFEAADDE}" type="slidenum">
               <a:rPr lang="es-ES" smtClean="0"/>
-              <a:t>‹Nº›</a:t>
+              <a:t>‹#›</a:t>
             </a:fld>
             <a:endParaRPr lang="es-ES"/>
           </a:p>
@@ -3548,7 +3620,7 @@
           <a:p>
             <a:fld id="{1C047EFF-C005-42C2-96C9-4E7CFE047116}" type="datetimeFigureOut">
               <a:rPr lang="es-ES" smtClean="0"/>
-              <a:t>29/03/2022</a:t>
+              <a:t>17/07/2023</a:t>
             </a:fld>
             <a:endParaRPr lang="es-ES"/>
           </a:p>
@@ -3638,7 +3710,7 @@
           <a:p>
             <a:fld id="{A4D22831-E02E-4D02-9CB9-6EB6AFEAADDE}" type="slidenum">
               <a:rPr lang="es-ES" smtClean="0"/>
-              <a:t>‹Nº›</a:t>
+              <a:t>‹#›</a:t>
             </a:fld>
             <a:endParaRPr lang="es-ES"/>
           </a:p>
@@ -4451,8 +4523,8 @@
           </a:p>
         </p:txBody>
       </p:sp>
-      <mc:AlternateContent xmlns:mc="http://schemas.openxmlformats.org/markup-compatibility/2006">
-        <mc:Choice xmlns:a14="http://schemas.microsoft.com/office/drawing/2010/main" Requires="a14">
+      <mc:AlternateContent xmlns:mc="http://schemas.openxmlformats.org/markup-compatibility/2006" xmlns:a14="http://schemas.microsoft.com/office/drawing/2010/main">
+        <mc:Choice Requires="a14">
           <p:sp>
             <p:nvSpPr>
               <p:cNvPr id="4" name="CuadroTexto 3">
@@ -5223,7 +5295,7 @@
             </p:txBody>
           </p:sp>
         </mc:Choice>
-        <mc:Fallback>
+        <mc:Fallback xmlns="">
           <p:sp>
             <p:nvSpPr>
               <p:cNvPr id="4" name="CuadroTexto 3">
@@ -8012,6 +8084,124 @@
           <a:chExt cx="0" cy="0"/>
         </a:xfrm>
       </p:grpSpPr>
+      <p:pic>
+        <p:nvPicPr>
+          <p:cNvPr id="2" name="Picture 1">
+            <a:extLst>
+              <a:ext uri="{FF2B5EF4-FFF2-40B4-BE49-F238E27FC236}">
+                <a16:creationId xmlns:a16="http://schemas.microsoft.com/office/drawing/2014/main" id="{D5C28000-9400-D594-1C16-C516F0A4E7B6}"/>
+              </a:ext>
+            </a:extLst>
+          </p:cNvPr>
+          <p:cNvPicPr>
+            <a:picLocks noChangeAspect="1"/>
+          </p:cNvPicPr>
+          <p:nvPr/>
+        </p:nvPicPr>
+        <p:blipFill>
+          <a:blip r:embed="rId2"/>
+          <a:stretch>
+            <a:fillRect/>
+          </a:stretch>
+        </p:blipFill>
+        <p:spPr>
+          <a:xfrm>
+            <a:off x="812800" y="618067"/>
+            <a:ext cx="4572000" cy="4572000"/>
+          </a:xfrm>
+          <a:prstGeom prst="rect">
+            <a:avLst/>
+          </a:prstGeom>
+        </p:spPr>
+      </p:pic>
+      <p:pic>
+        <p:nvPicPr>
+          <p:cNvPr id="3" name="Picture 2">
+            <a:extLst>
+              <a:ext uri="{FF2B5EF4-FFF2-40B4-BE49-F238E27FC236}">
+                <a16:creationId xmlns:a16="http://schemas.microsoft.com/office/drawing/2014/main" id="{BAE887E4-4F3A-65A2-6BB4-D797AD40644A}"/>
+              </a:ext>
+            </a:extLst>
+          </p:cNvPr>
+          <p:cNvPicPr>
+            <a:picLocks noChangeAspect="1"/>
+          </p:cNvPicPr>
+          <p:nvPr/>
+        </p:nvPicPr>
+        <p:blipFill rotWithShape="1">
+          <a:blip r:embed="rId2"/>
+          <a:srcRect l="11637" t="54557" r="7573" b="2977"/>
+          <a:stretch/>
+        </p:blipFill>
+        <p:spPr>
+          <a:xfrm>
+            <a:off x="7339263" y="3248526"/>
+            <a:ext cx="3693696" cy="1941541"/>
+          </a:xfrm>
+          <a:prstGeom prst="rect">
+            <a:avLst/>
+          </a:prstGeom>
+        </p:spPr>
+      </p:pic>
+    </p:spTree>
+    <p:extLst>
+      <p:ext uri="{BB962C8B-B14F-4D97-AF65-F5344CB8AC3E}">
+        <p14:creationId xmlns:p14="http://schemas.microsoft.com/office/powerpoint/2010/main" val="2816021084"/>
+      </p:ext>
+    </p:extLst>
+  </p:cSld>
+  <p:clrMapOvr>
+    <a:masterClrMapping/>
+  </p:clrMapOvr>
+</p:sld>
+</file>
+
+<file path=ppt/slides/slide7.xml><?xml version="1.0" encoding="utf-8"?>
+<p:sld xmlns:a="http://schemas.openxmlformats.org/drawingml/2006/main" xmlns:r="http://schemas.openxmlformats.org/officeDocument/2006/relationships" xmlns:p="http://schemas.openxmlformats.org/presentationml/2006/main">
+  <p:cSld>
+    <p:spTree>
+      <p:nvGrpSpPr>
+        <p:cNvPr id="1" name=""/>
+        <p:cNvGrpSpPr/>
+        <p:nvPr/>
+      </p:nvGrpSpPr>
+      <p:grpSpPr>
+        <a:xfrm>
+          <a:off x="0" y="0"/>
+          <a:ext cx="0" cy="0"/>
+          <a:chOff x="0" y="0"/>
+          <a:chExt cx="0" cy="0"/>
+        </a:xfrm>
+      </p:grpSpPr>
+      <p:pic>
+        <p:nvPicPr>
+          <p:cNvPr id="3" name="Picture 2">
+            <a:extLst>
+              <a:ext uri="{FF2B5EF4-FFF2-40B4-BE49-F238E27FC236}">
+                <a16:creationId xmlns:a16="http://schemas.microsoft.com/office/drawing/2014/main" id="{0578D19B-E215-BAE6-5AB5-A674798648E2}"/>
+              </a:ext>
+            </a:extLst>
+          </p:cNvPr>
+          <p:cNvPicPr>
+            <a:picLocks noChangeAspect="1"/>
+          </p:cNvPicPr>
+          <p:nvPr/>
+        </p:nvPicPr>
+        <p:blipFill rotWithShape="1">
+          <a:blip r:embed="rId2"/>
+          <a:srcRect l="11637" t="54557" r="7573" b="2977"/>
+          <a:stretch/>
+        </p:blipFill>
+        <p:spPr>
+          <a:xfrm>
+            <a:off x="1414653" y="5259866"/>
+            <a:ext cx="2023652" cy="1063705"/>
+          </a:xfrm>
+          <a:prstGeom prst="rect">
+            <a:avLst/>
+          </a:prstGeom>
+        </p:spPr>
+      </p:pic>
       <p:cxnSp>
         <p:nvCxnSpPr>
           <p:cNvPr id="7" name="Conector recto de flecha 6">
@@ -8697,7 +8887,7 @@
         <p:spPr>
           <a:xfrm>
             <a:off x="6893317" y="2172683"/>
-            <a:ext cx="2007024" cy="461665"/>
+            <a:ext cx="1856598" cy="461665"/>
           </a:xfrm>
           <a:prstGeom prst="rect">
             <a:avLst/>
@@ -8712,7 +8902,7 @@
           <a:p>
             <a:r>
               <a:rPr lang="ca-ES" sz="2400" b="1" dirty="0"/>
-              <a:t>/ydlidar_node</a:t>
+              <a:t>/rplidarNode</a:t>
             </a:r>
             <a:endParaRPr lang="es-ES" sz="2400" b="1" dirty="0"/>
           </a:p>
@@ -8816,8 +9006,8 @@
         </p:nvSpPr>
         <p:spPr>
           <a:xfrm>
-            <a:off x="6722374" y="544301"/>
-            <a:ext cx="2269660" cy="461665"/>
+            <a:off x="7131662" y="494379"/>
+            <a:ext cx="1454052" cy="461665"/>
           </a:xfrm>
           <a:prstGeom prst="rect">
             <a:avLst/>
@@ -8832,7 +9022,7 @@
           <a:p>
             <a:r>
               <a:rPr lang="ca-ES" sz="2400" b="1" dirty="0"/>
-              <a:t>/raspicam_node</a:t>
+              <a:t>/usb_cam</a:t>
             </a:r>
             <a:endParaRPr lang="es-ES" sz="2400" b="1" dirty="0"/>
           </a:p>
@@ -8888,8 +9078,8 @@
         </p:nvSpPr>
         <p:spPr>
           <a:xfrm>
-            <a:off x="5108845" y="213897"/>
-            <a:ext cx="876715" cy="461665"/>
+            <a:off x="3612426" y="186848"/>
+            <a:ext cx="2998065" cy="461665"/>
           </a:xfrm>
           <a:prstGeom prst="rect">
             <a:avLst/>
@@ -8908,7 +9098,7 @@
                   <a:srgbClr val="FF0000"/>
                 </a:solidFill>
               </a:rPr>
-              <a:t>/scan</a:t>
+              <a:t>/usb_cam/image_raw</a:t>
             </a:r>
             <a:endParaRPr lang="es-ES" sz="2400" b="1" dirty="0">
               <a:solidFill>
@@ -9024,7 +9214,7 @@
           <p:nvPr/>
         </p:nvPicPr>
         <p:blipFill>
-          <a:blip r:embed="rId2"/>
+          <a:blip r:embed="rId3"/>
           <a:stretch>
             <a:fillRect/>
           </a:stretch>

</xml_diff>

<commit_message>
bringup pi and arduino
</commit_message>
<xml_diff>
--- a/Documentation/Images/Mecanum_Images.pptx
+++ b/Documentation/Images/Mecanum_Images.pptx
@@ -9,9 +9,10 @@
     <p:sldId id="257" r:id="rId3"/>
     <p:sldId id="263" r:id="rId4"/>
     <p:sldId id="264" r:id="rId5"/>
-    <p:sldId id="258" r:id="rId6"/>
-    <p:sldId id="265" r:id="rId7"/>
-    <p:sldId id="262" r:id="rId8"/>
+    <p:sldId id="265" r:id="rId6"/>
+    <p:sldId id="262" r:id="rId7"/>
+    <p:sldId id="267" r:id="rId8"/>
+    <p:sldId id="266" r:id="rId9"/>
   </p:sldIdLst>
   <p:sldSz cx="12192000" cy="6858000"/>
   <p:notesSz cx="6858000" cy="9144000"/>
@@ -129,110 +130,119 @@
 <file path=ppt/changesInfos/changesInfo1.xml><?xml version="1.0" encoding="utf-8"?>
 <pc:chgInfo xmlns:a="http://schemas.openxmlformats.org/drawingml/2006/main" xmlns:r="http://schemas.openxmlformats.org/officeDocument/2006/relationships" xmlns:ac="http://schemas.microsoft.com/office/drawing/2013/main/command" xmlns:pc="http://schemas.microsoft.com/office/powerpoint/2013/main/command">
   <pc:docChgLst>
-    <pc:chgData name="Dr. Manel Puig i Vidal" userId="0d549d0e-cb25-4ad8-b3a5-db046c349dfe" providerId="ADAL" clId="{A32D92DA-AB7E-402E-AFA7-3BA5519375E5}"/>
-    <pc:docChg chg="custSel addSld modSld">
-      <pc:chgData name="Dr. Manel Puig i Vidal" userId="0d549d0e-cb25-4ad8-b3a5-db046c349dfe" providerId="ADAL" clId="{A32D92DA-AB7E-402E-AFA7-3BA5519375E5}" dt="2021-08-03T11:19:44.683" v="44" actId="1036"/>
+    <pc:chgData name="Dr. Manel Puig i Vidal" userId="0d549d0e-cb25-4ad8-b3a5-db046c349dfe" providerId="ADAL" clId="{F9C99AA7-39A0-4FA7-BDB9-58E93BB78F39}"/>
+    <pc:docChg chg="modSld">
+      <pc:chgData name="Dr. Manel Puig i Vidal" userId="0d549d0e-cb25-4ad8-b3a5-db046c349dfe" providerId="ADAL" clId="{F9C99AA7-39A0-4FA7-BDB9-58E93BB78F39}" dt="2022-03-17T13:26:38.836" v="33" actId="1036"/>
       <pc:docMkLst>
         <pc:docMk/>
       </pc:docMkLst>
-      <pc:sldChg chg="addSp delSp modSp mod">
-        <pc:chgData name="Dr. Manel Puig i Vidal" userId="0d549d0e-cb25-4ad8-b3a5-db046c349dfe" providerId="ADAL" clId="{A32D92DA-AB7E-402E-AFA7-3BA5519375E5}" dt="2021-08-03T11:19:44.683" v="44" actId="1036"/>
+      <pc:sldChg chg="addSp modSp mod">
+        <pc:chgData name="Dr. Manel Puig i Vidal" userId="0d549d0e-cb25-4ad8-b3a5-db046c349dfe" providerId="ADAL" clId="{F9C99AA7-39A0-4FA7-BDB9-58E93BB78F39}" dt="2022-03-17T13:26:38.836" v="33" actId="1036"/>
         <pc:sldMkLst>
           <pc:docMk/>
-          <pc:sldMk cId="3288817590" sldId="257"/>
+          <pc:sldMk cId="2329590683" sldId="263"/>
         </pc:sldMkLst>
-        <pc:picChg chg="del mod">
-          <ac:chgData name="Dr. Manel Puig i Vidal" userId="0d549d0e-cb25-4ad8-b3a5-db046c349dfe" providerId="ADAL" clId="{A32D92DA-AB7E-402E-AFA7-3BA5519375E5}" dt="2021-08-03T11:17:24.558" v="14" actId="21"/>
+        <pc:spChg chg="add mod">
+          <ac:chgData name="Dr. Manel Puig i Vidal" userId="0d549d0e-cb25-4ad8-b3a5-db046c349dfe" providerId="ADAL" clId="{F9C99AA7-39A0-4FA7-BDB9-58E93BB78F39}" dt="2022-03-17T13:25:33.305" v="8" actId="113"/>
+          <ac:spMkLst>
+            <pc:docMk/>
+            <pc:sldMk cId="2329590683" sldId="263"/>
+            <ac:spMk id="2" creationId="{1ED916FD-A6A2-4CC1-B267-E6D20E5B9C53}"/>
+          </ac:spMkLst>
+        </pc:spChg>
+        <pc:spChg chg="add mod">
+          <ac:chgData name="Dr. Manel Puig i Vidal" userId="0d549d0e-cb25-4ad8-b3a5-db046c349dfe" providerId="ADAL" clId="{F9C99AA7-39A0-4FA7-BDB9-58E93BB78F39}" dt="2022-03-17T13:25:50.385" v="14" actId="20577"/>
+          <ac:spMkLst>
+            <pc:docMk/>
+            <pc:sldMk cId="2329590683" sldId="263"/>
+            <ac:spMk id="6" creationId="{A3A9FB9D-1E16-4D1C-AAD3-A4354B6E5904}"/>
+          </ac:spMkLst>
+        </pc:spChg>
+        <pc:spChg chg="add mod">
+          <ac:chgData name="Dr. Manel Puig i Vidal" userId="0d549d0e-cb25-4ad8-b3a5-db046c349dfe" providerId="ADAL" clId="{F9C99AA7-39A0-4FA7-BDB9-58E93BB78F39}" dt="2022-03-17T13:26:38.836" v="33" actId="1036"/>
+          <ac:spMkLst>
+            <pc:docMk/>
+            <pc:sldMk cId="2329590683" sldId="263"/>
+            <ac:spMk id="7" creationId="{5223A30E-3AC4-4D27-933A-7F5FDFEFE23B}"/>
+          </ac:spMkLst>
+        </pc:spChg>
+        <pc:spChg chg="add mod">
+          <ac:chgData name="Dr. Manel Puig i Vidal" userId="0d549d0e-cb25-4ad8-b3a5-db046c349dfe" providerId="ADAL" clId="{F9C99AA7-39A0-4FA7-BDB9-58E93BB78F39}" dt="2022-03-17T13:26:38.836" v="33" actId="1036"/>
+          <ac:spMkLst>
+            <pc:docMk/>
+            <pc:sldMk cId="2329590683" sldId="263"/>
+            <ac:spMk id="8" creationId="{D4CAE3A1-2391-4F9D-A564-BCF73591CAC8}"/>
+          </ac:spMkLst>
+        </pc:spChg>
+      </pc:sldChg>
+    </pc:docChg>
+  </pc:docChgLst>
+  <pc:docChgLst>
+    <pc:chgData name="Dr. Manel Puig i Vidal" userId="0d549d0e-cb25-4ad8-b3a5-db046c349dfe" providerId="ADAL" clId="{F5ACA060-5617-4C2B-9B9E-0FDF112D5DD6}"/>
+    <pc:docChg chg="addSld modSld">
+      <pc:chgData name="Dr. Manel Puig i Vidal" userId="0d549d0e-cb25-4ad8-b3a5-db046c349dfe" providerId="ADAL" clId="{F5ACA060-5617-4C2B-9B9E-0FDF112D5DD6}" dt="2023-07-17T12:17:17.614" v="28" actId="1076"/>
+      <pc:docMkLst>
+        <pc:docMk/>
+      </pc:docMkLst>
+      <pc:sldChg chg="addSp modSp mod">
+        <pc:chgData name="Dr. Manel Puig i Vidal" userId="0d549d0e-cb25-4ad8-b3a5-db046c349dfe" providerId="ADAL" clId="{F5ACA060-5617-4C2B-9B9E-0FDF112D5DD6}" dt="2023-07-17T12:17:17.614" v="28" actId="1076"/>
+        <pc:sldMkLst>
+          <pc:docMk/>
+          <pc:sldMk cId="2967436431" sldId="262"/>
+        </pc:sldMkLst>
+        <pc:spChg chg="mod">
+          <ac:chgData name="Dr. Manel Puig i Vidal" userId="0d549d0e-cb25-4ad8-b3a5-db046c349dfe" providerId="ADAL" clId="{F5ACA060-5617-4C2B-9B9E-0FDF112D5DD6}" dt="2023-07-17T12:15:39.929" v="18" actId="20577"/>
+          <ac:spMkLst>
+            <pc:docMk/>
+            <pc:sldMk cId="2967436431" sldId="262"/>
+            <ac:spMk id="2" creationId="{AB3A1AF0-3ED5-442C-8DF2-A8AD170DB81F}"/>
+          </ac:spMkLst>
+        </pc:spChg>
+        <pc:spChg chg="mod">
+          <ac:chgData name="Dr. Manel Puig i Vidal" userId="0d549d0e-cb25-4ad8-b3a5-db046c349dfe" providerId="ADAL" clId="{F5ACA060-5617-4C2B-9B9E-0FDF112D5DD6}" dt="2023-07-17T12:16:24.302" v="26" actId="1076"/>
+          <ac:spMkLst>
+            <pc:docMk/>
+            <pc:sldMk cId="2967436431" sldId="262"/>
+            <ac:spMk id="28" creationId="{C7B3A669-0D52-43CF-BFD3-9E36671C979A}"/>
+          </ac:spMkLst>
+        </pc:spChg>
+        <pc:spChg chg="mod">
+          <ac:chgData name="Dr. Manel Puig i Vidal" userId="0d549d0e-cb25-4ad8-b3a5-db046c349dfe" providerId="ADAL" clId="{F5ACA060-5617-4C2B-9B9E-0FDF112D5DD6}" dt="2023-07-17T12:17:17.614" v="28" actId="1076"/>
+          <ac:spMkLst>
+            <pc:docMk/>
+            <pc:sldMk cId="2967436431" sldId="262"/>
+            <ac:spMk id="30" creationId="{E0806900-E02C-4F19-9DF4-14F27003E0A9}"/>
+          </ac:spMkLst>
+        </pc:spChg>
+        <pc:picChg chg="add mod ord">
+          <ac:chgData name="Dr. Manel Puig i Vidal" userId="0d549d0e-cb25-4ad8-b3a5-db046c349dfe" providerId="ADAL" clId="{F5ACA060-5617-4C2B-9B9E-0FDF112D5DD6}" dt="2023-07-17T12:13:25.926" v="13" actId="1076"/>
           <ac:picMkLst>
             <pc:docMk/>
-            <pc:sldMk cId="3288817590" sldId="257"/>
-            <ac:picMk id="3" creationId="{D927769E-DCF3-4F9A-8075-F590AA04FA64}"/>
-          </ac:picMkLst>
-        </pc:picChg>
-        <pc:picChg chg="add mod">
-          <ac:chgData name="Dr. Manel Puig i Vidal" userId="0d549d0e-cb25-4ad8-b3a5-db046c349dfe" providerId="ADAL" clId="{A32D92DA-AB7E-402E-AFA7-3BA5519375E5}" dt="2021-08-03T11:19:44.683" v="44" actId="1036"/>
-          <ac:picMkLst>
-            <pc:docMk/>
-            <pc:sldMk cId="3288817590" sldId="257"/>
-            <ac:picMk id="4" creationId="{BD5A579D-632A-486C-88FB-4C7B9BB66756}"/>
-          </ac:picMkLst>
-        </pc:picChg>
-        <pc:picChg chg="del mod">
-          <ac:chgData name="Dr. Manel Puig i Vidal" userId="0d549d0e-cb25-4ad8-b3a5-db046c349dfe" providerId="ADAL" clId="{A32D92DA-AB7E-402E-AFA7-3BA5519375E5}" dt="2021-08-03T11:17:24.558" v="14" actId="21"/>
-          <ac:picMkLst>
-            <pc:docMk/>
-            <pc:sldMk cId="3288817590" sldId="257"/>
-            <ac:picMk id="5" creationId="{B75DBB8B-3B78-49A5-9F6D-95478A41D8C3}"/>
-          </ac:picMkLst>
-        </pc:picChg>
-        <pc:picChg chg="del mod">
-          <ac:chgData name="Dr. Manel Puig i Vidal" userId="0d549d0e-cb25-4ad8-b3a5-db046c349dfe" providerId="ADAL" clId="{A32D92DA-AB7E-402E-AFA7-3BA5519375E5}" dt="2021-08-03T11:17:24.558" v="14" actId="21"/>
-          <ac:picMkLst>
-            <pc:docMk/>
-            <pc:sldMk cId="3288817590" sldId="257"/>
-            <ac:picMk id="7" creationId="{537CBAE9-E2B3-4FA3-B3E5-7867D6406295}"/>
-          </ac:picMkLst>
-        </pc:picChg>
-        <pc:picChg chg="add mod">
-          <ac:chgData name="Dr. Manel Puig i Vidal" userId="0d549d0e-cb25-4ad8-b3a5-db046c349dfe" providerId="ADAL" clId="{A32D92DA-AB7E-402E-AFA7-3BA5519375E5}" dt="2021-08-03T11:19:44.683" v="44" actId="1036"/>
-          <ac:picMkLst>
-            <pc:docMk/>
-            <pc:sldMk cId="3288817590" sldId="257"/>
-            <ac:picMk id="8" creationId="{593E3BDD-5ED6-422E-B4B9-1EF88DF10C94}"/>
+            <pc:sldMk cId="2967436431" sldId="262"/>
+            <ac:picMk id="3" creationId="{0578D19B-E215-BAE6-5AB5-A674798648E2}"/>
           </ac:picMkLst>
         </pc:picChg>
       </pc:sldChg>
       <pc:sldChg chg="addSp modSp new mod">
-        <pc:chgData name="Dr. Manel Puig i Vidal" userId="0d549d0e-cb25-4ad8-b3a5-db046c349dfe" providerId="ADAL" clId="{A32D92DA-AB7E-402E-AFA7-3BA5519375E5}" dt="2021-08-03T11:18:25.885" v="22" actId="1076"/>
+        <pc:chgData name="Dr. Manel Puig i Vidal" userId="0d549d0e-cb25-4ad8-b3a5-db046c349dfe" providerId="ADAL" clId="{F5ACA060-5617-4C2B-9B9E-0FDF112D5DD6}" dt="2023-07-17T12:12:42.367" v="7" actId="732"/>
         <pc:sldMkLst>
           <pc:docMk/>
-          <pc:sldMk cId="2329590683" sldId="263"/>
+          <pc:sldMk cId="2816021084" sldId="265"/>
         </pc:sldMkLst>
         <pc:picChg chg="add mod">
-          <ac:chgData name="Dr. Manel Puig i Vidal" userId="0d549d0e-cb25-4ad8-b3a5-db046c349dfe" providerId="ADAL" clId="{A32D92DA-AB7E-402E-AFA7-3BA5519375E5}" dt="2021-08-03T11:18:21.428" v="21" actId="1076"/>
+          <ac:chgData name="Dr. Manel Puig i Vidal" userId="0d549d0e-cb25-4ad8-b3a5-db046c349dfe" providerId="ADAL" clId="{F5ACA060-5617-4C2B-9B9E-0FDF112D5DD6}" dt="2023-07-17T12:12:09.908" v="2" actId="1076"/>
           <ac:picMkLst>
             <pc:docMk/>
-            <pc:sldMk cId="2329590683" sldId="263"/>
-            <ac:picMk id="3" creationId="{354A659A-08A3-43A5-9847-BD37EC81DFDE}"/>
+            <pc:sldMk cId="2816021084" sldId="265"/>
+            <ac:picMk id="2" creationId="{D5C28000-9400-D594-1C16-C516F0A4E7B6}"/>
           </ac:picMkLst>
         </pc:picChg>
-        <pc:picChg chg="add mod">
-          <ac:chgData name="Dr. Manel Puig i Vidal" userId="0d549d0e-cb25-4ad8-b3a5-db046c349dfe" providerId="ADAL" clId="{A32D92DA-AB7E-402E-AFA7-3BA5519375E5}" dt="2021-08-03T11:18:25.885" v="22" actId="1076"/>
+        <pc:picChg chg="add mod modCrop">
+          <ac:chgData name="Dr. Manel Puig i Vidal" userId="0d549d0e-cb25-4ad8-b3a5-db046c349dfe" providerId="ADAL" clId="{F5ACA060-5617-4C2B-9B9E-0FDF112D5DD6}" dt="2023-07-17T12:12:42.367" v="7" actId="732"/>
           <ac:picMkLst>
             <pc:docMk/>
-            <pc:sldMk cId="2329590683" sldId="263"/>
-            <ac:picMk id="5" creationId="{D75C9759-8C04-4BDA-AA54-582352963965}"/>
-          </ac:picMkLst>
-        </pc:picChg>
-      </pc:sldChg>
-      <pc:sldChg chg="addSp modSp new">
-        <pc:chgData name="Dr. Manel Puig i Vidal" userId="0d549d0e-cb25-4ad8-b3a5-db046c349dfe" providerId="ADAL" clId="{A32D92DA-AB7E-402E-AFA7-3BA5519375E5}" dt="2021-08-03T11:17:31.302" v="16"/>
-        <pc:sldMkLst>
-          <pc:docMk/>
-          <pc:sldMk cId="4011816797" sldId="264"/>
-        </pc:sldMkLst>
-        <pc:picChg chg="add mod">
-          <ac:chgData name="Dr. Manel Puig i Vidal" userId="0d549d0e-cb25-4ad8-b3a5-db046c349dfe" providerId="ADAL" clId="{A32D92DA-AB7E-402E-AFA7-3BA5519375E5}" dt="2021-08-03T11:17:31.302" v="16"/>
-          <ac:picMkLst>
-            <pc:docMk/>
-            <pc:sldMk cId="4011816797" sldId="264"/>
-            <ac:picMk id="2" creationId="{54008698-7B82-4808-B06A-1C1A72A08D76}"/>
-          </ac:picMkLst>
-        </pc:picChg>
-        <pc:picChg chg="add mod">
-          <ac:chgData name="Dr. Manel Puig i Vidal" userId="0d549d0e-cb25-4ad8-b3a5-db046c349dfe" providerId="ADAL" clId="{A32D92DA-AB7E-402E-AFA7-3BA5519375E5}" dt="2021-08-03T11:17:31.302" v="16"/>
-          <ac:picMkLst>
-            <pc:docMk/>
-            <pc:sldMk cId="4011816797" sldId="264"/>
-            <ac:picMk id="3" creationId="{0D083199-F003-41EB-9D24-CD4325EB2844}"/>
-          </ac:picMkLst>
-        </pc:picChg>
-        <pc:picChg chg="add mod">
-          <ac:chgData name="Dr. Manel Puig i Vidal" userId="0d549d0e-cb25-4ad8-b3a5-db046c349dfe" providerId="ADAL" clId="{A32D92DA-AB7E-402E-AFA7-3BA5519375E5}" dt="2021-08-03T11:17:31.302" v="16"/>
-          <ac:picMkLst>
-            <pc:docMk/>
-            <pc:sldMk cId="4011816797" sldId="264"/>
-            <ac:picMk id="4" creationId="{6A29C0F2-8F38-447E-A623-B80CDBAF2702}"/>
+            <pc:sldMk cId="2816021084" sldId="265"/>
+            <ac:picMk id="3" creationId="{BAE887E4-4F3A-65A2-6BB4-D797AD40644A}"/>
           </ac:picMkLst>
         </pc:picChg>
       </pc:sldChg>
@@ -702,119 +712,110 @@
     </pc:docChg>
   </pc:docChgLst>
   <pc:docChgLst>
-    <pc:chgData name="Dr. Manel Puig i Vidal" userId="0d549d0e-cb25-4ad8-b3a5-db046c349dfe" providerId="ADAL" clId="{F9C99AA7-39A0-4FA7-BDB9-58E93BB78F39}"/>
-    <pc:docChg chg="modSld">
-      <pc:chgData name="Dr. Manel Puig i Vidal" userId="0d549d0e-cb25-4ad8-b3a5-db046c349dfe" providerId="ADAL" clId="{F9C99AA7-39A0-4FA7-BDB9-58E93BB78F39}" dt="2022-03-17T13:26:38.836" v="33" actId="1036"/>
+    <pc:chgData name="Dr. Manel Puig i Vidal" userId="0d549d0e-cb25-4ad8-b3a5-db046c349dfe" providerId="ADAL" clId="{A32D92DA-AB7E-402E-AFA7-3BA5519375E5}"/>
+    <pc:docChg chg="custSel addSld modSld">
+      <pc:chgData name="Dr. Manel Puig i Vidal" userId="0d549d0e-cb25-4ad8-b3a5-db046c349dfe" providerId="ADAL" clId="{A32D92DA-AB7E-402E-AFA7-3BA5519375E5}" dt="2021-08-03T11:19:44.683" v="44" actId="1036"/>
       <pc:docMkLst>
         <pc:docMk/>
       </pc:docMkLst>
-      <pc:sldChg chg="addSp modSp mod">
-        <pc:chgData name="Dr. Manel Puig i Vidal" userId="0d549d0e-cb25-4ad8-b3a5-db046c349dfe" providerId="ADAL" clId="{F9C99AA7-39A0-4FA7-BDB9-58E93BB78F39}" dt="2022-03-17T13:26:38.836" v="33" actId="1036"/>
+      <pc:sldChg chg="addSp delSp modSp mod">
+        <pc:chgData name="Dr. Manel Puig i Vidal" userId="0d549d0e-cb25-4ad8-b3a5-db046c349dfe" providerId="ADAL" clId="{A32D92DA-AB7E-402E-AFA7-3BA5519375E5}" dt="2021-08-03T11:19:44.683" v="44" actId="1036"/>
+        <pc:sldMkLst>
+          <pc:docMk/>
+          <pc:sldMk cId="3288817590" sldId="257"/>
+        </pc:sldMkLst>
+        <pc:picChg chg="del mod">
+          <ac:chgData name="Dr. Manel Puig i Vidal" userId="0d549d0e-cb25-4ad8-b3a5-db046c349dfe" providerId="ADAL" clId="{A32D92DA-AB7E-402E-AFA7-3BA5519375E5}" dt="2021-08-03T11:17:24.558" v="14" actId="21"/>
+          <ac:picMkLst>
+            <pc:docMk/>
+            <pc:sldMk cId="3288817590" sldId="257"/>
+            <ac:picMk id="3" creationId="{D927769E-DCF3-4F9A-8075-F590AA04FA64}"/>
+          </ac:picMkLst>
+        </pc:picChg>
+        <pc:picChg chg="add mod">
+          <ac:chgData name="Dr. Manel Puig i Vidal" userId="0d549d0e-cb25-4ad8-b3a5-db046c349dfe" providerId="ADAL" clId="{A32D92DA-AB7E-402E-AFA7-3BA5519375E5}" dt="2021-08-03T11:19:44.683" v="44" actId="1036"/>
+          <ac:picMkLst>
+            <pc:docMk/>
+            <pc:sldMk cId="3288817590" sldId="257"/>
+            <ac:picMk id="4" creationId="{BD5A579D-632A-486C-88FB-4C7B9BB66756}"/>
+          </ac:picMkLst>
+        </pc:picChg>
+        <pc:picChg chg="del mod">
+          <ac:chgData name="Dr. Manel Puig i Vidal" userId="0d549d0e-cb25-4ad8-b3a5-db046c349dfe" providerId="ADAL" clId="{A32D92DA-AB7E-402E-AFA7-3BA5519375E5}" dt="2021-08-03T11:17:24.558" v="14" actId="21"/>
+          <ac:picMkLst>
+            <pc:docMk/>
+            <pc:sldMk cId="3288817590" sldId="257"/>
+            <ac:picMk id="5" creationId="{B75DBB8B-3B78-49A5-9F6D-95478A41D8C3}"/>
+          </ac:picMkLst>
+        </pc:picChg>
+        <pc:picChg chg="del mod">
+          <ac:chgData name="Dr. Manel Puig i Vidal" userId="0d549d0e-cb25-4ad8-b3a5-db046c349dfe" providerId="ADAL" clId="{A32D92DA-AB7E-402E-AFA7-3BA5519375E5}" dt="2021-08-03T11:17:24.558" v="14" actId="21"/>
+          <ac:picMkLst>
+            <pc:docMk/>
+            <pc:sldMk cId="3288817590" sldId="257"/>
+            <ac:picMk id="7" creationId="{537CBAE9-E2B3-4FA3-B3E5-7867D6406295}"/>
+          </ac:picMkLst>
+        </pc:picChg>
+        <pc:picChg chg="add mod">
+          <ac:chgData name="Dr. Manel Puig i Vidal" userId="0d549d0e-cb25-4ad8-b3a5-db046c349dfe" providerId="ADAL" clId="{A32D92DA-AB7E-402E-AFA7-3BA5519375E5}" dt="2021-08-03T11:19:44.683" v="44" actId="1036"/>
+          <ac:picMkLst>
+            <pc:docMk/>
+            <pc:sldMk cId="3288817590" sldId="257"/>
+            <ac:picMk id="8" creationId="{593E3BDD-5ED6-422E-B4B9-1EF88DF10C94}"/>
+          </ac:picMkLst>
+        </pc:picChg>
+      </pc:sldChg>
+      <pc:sldChg chg="addSp modSp new mod">
+        <pc:chgData name="Dr. Manel Puig i Vidal" userId="0d549d0e-cb25-4ad8-b3a5-db046c349dfe" providerId="ADAL" clId="{A32D92DA-AB7E-402E-AFA7-3BA5519375E5}" dt="2021-08-03T11:18:25.885" v="22" actId="1076"/>
         <pc:sldMkLst>
           <pc:docMk/>
           <pc:sldMk cId="2329590683" sldId="263"/>
         </pc:sldMkLst>
-        <pc:spChg chg="add mod">
-          <ac:chgData name="Dr. Manel Puig i Vidal" userId="0d549d0e-cb25-4ad8-b3a5-db046c349dfe" providerId="ADAL" clId="{F9C99AA7-39A0-4FA7-BDB9-58E93BB78F39}" dt="2022-03-17T13:25:33.305" v="8" actId="113"/>
-          <ac:spMkLst>
+        <pc:picChg chg="add mod">
+          <ac:chgData name="Dr. Manel Puig i Vidal" userId="0d549d0e-cb25-4ad8-b3a5-db046c349dfe" providerId="ADAL" clId="{A32D92DA-AB7E-402E-AFA7-3BA5519375E5}" dt="2021-08-03T11:18:21.428" v="21" actId="1076"/>
+          <ac:picMkLst>
             <pc:docMk/>
             <pc:sldMk cId="2329590683" sldId="263"/>
-            <ac:spMk id="2" creationId="{1ED916FD-A6A2-4CC1-B267-E6D20E5B9C53}"/>
-          </ac:spMkLst>
-        </pc:spChg>
-        <pc:spChg chg="add mod">
-          <ac:chgData name="Dr. Manel Puig i Vidal" userId="0d549d0e-cb25-4ad8-b3a5-db046c349dfe" providerId="ADAL" clId="{F9C99AA7-39A0-4FA7-BDB9-58E93BB78F39}" dt="2022-03-17T13:25:50.385" v="14" actId="20577"/>
-          <ac:spMkLst>
+            <ac:picMk id="3" creationId="{354A659A-08A3-43A5-9847-BD37EC81DFDE}"/>
+          </ac:picMkLst>
+        </pc:picChg>
+        <pc:picChg chg="add mod">
+          <ac:chgData name="Dr. Manel Puig i Vidal" userId="0d549d0e-cb25-4ad8-b3a5-db046c349dfe" providerId="ADAL" clId="{A32D92DA-AB7E-402E-AFA7-3BA5519375E5}" dt="2021-08-03T11:18:25.885" v="22" actId="1076"/>
+          <ac:picMkLst>
             <pc:docMk/>
             <pc:sldMk cId="2329590683" sldId="263"/>
-            <ac:spMk id="6" creationId="{A3A9FB9D-1E16-4D1C-AAD3-A4354B6E5904}"/>
-          </ac:spMkLst>
-        </pc:spChg>
-        <pc:spChg chg="add mod">
-          <ac:chgData name="Dr. Manel Puig i Vidal" userId="0d549d0e-cb25-4ad8-b3a5-db046c349dfe" providerId="ADAL" clId="{F9C99AA7-39A0-4FA7-BDB9-58E93BB78F39}" dt="2022-03-17T13:26:38.836" v="33" actId="1036"/>
-          <ac:spMkLst>
-            <pc:docMk/>
-            <pc:sldMk cId="2329590683" sldId="263"/>
-            <ac:spMk id="7" creationId="{5223A30E-3AC4-4D27-933A-7F5FDFEFE23B}"/>
-          </ac:spMkLst>
-        </pc:spChg>
-        <pc:spChg chg="add mod">
-          <ac:chgData name="Dr. Manel Puig i Vidal" userId="0d549d0e-cb25-4ad8-b3a5-db046c349dfe" providerId="ADAL" clId="{F9C99AA7-39A0-4FA7-BDB9-58E93BB78F39}" dt="2022-03-17T13:26:38.836" v="33" actId="1036"/>
-          <ac:spMkLst>
-            <pc:docMk/>
-            <pc:sldMk cId="2329590683" sldId="263"/>
-            <ac:spMk id="8" creationId="{D4CAE3A1-2391-4F9D-A564-BCF73591CAC8}"/>
-          </ac:spMkLst>
-        </pc:spChg>
-      </pc:sldChg>
-    </pc:docChg>
-  </pc:docChgLst>
-  <pc:docChgLst>
-    <pc:chgData name="Dr. Manel Puig i Vidal" userId="0d549d0e-cb25-4ad8-b3a5-db046c349dfe" providerId="ADAL" clId="{F5ACA060-5617-4C2B-9B9E-0FDF112D5DD6}"/>
-    <pc:docChg chg="addSld modSld">
-      <pc:chgData name="Dr. Manel Puig i Vidal" userId="0d549d0e-cb25-4ad8-b3a5-db046c349dfe" providerId="ADAL" clId="{F5ACA060-5617-4C2B-9B9E-0FDF112D5DD6}" dt="2023-07-17T12:17:17.614" v="28" actId="1076"/>
-      <pc:docMkLst>
-        <pc:docMk/>
-      </pc:docMkLst>
-      <pc:sldChg chg="addSp modSp mod">
-        <pc:chgData name="Dr. Manel Puig i Vidal" userId="0d549d0e-cb25-4ad8-b3a5-db046c349dfe" providerId="ADAL" clId="{F5ACA060-5617-4C2B-9B9E-0FDF112D5DD6}" dt="2023-07-17T12:17:17.614" v="28" actId="1076"/>
-        <pc:sldMkLst>
-          <pc:docMk/>
-          <pc:sldMk cId="2967436431" sldId="262"/>
-        </pc:sldMkLst>
-        <pc:spChg chg="mod">
-          <ac:chgData name="Dr. Manel Puig i Vidal" userId="0d549d0e-cb25-4ad8-b3a5-db046c349dfe" providerId="ADAL" clId="{F5ACA060-5617-4C2B-9B9E-0FDF112D5DD6}" dt="2023-07-17T12:15:39.929" v="18" actId="20577"/>
-          <ac:spMkLst>
-            <pc:docMk/>
-            <pc:sldMk cId="2967436431" sldId="262"/>
-            <ac:spMk id="2" creationId="{AB3A1AF0-3ED5-442C-8DF2-A8AD170DB81F}"/>
-          </ac:spMkLst>
-        </pc:spChg>
-        <pc:spChg chg="mod">
-          <ac:chgData name="Dr. Manel Puig i Vidal" userId="0d549d0e-cb25-4ad8-b3a5-db046c349dfe" providerId="ADAL" clId="{F5ACA060-5617-4C2B-9B9E-0FDF112D5DD6}" dt="2023-07-17T12:16:24.302" v="26" actId="1076"/>
-          <ac:spMkLst>
-            <pc:docMk/>
-            <pc:sldMk cId="2967436431" sldId="262"/>
-            <ac:spMk id="28" creationId="{C7B3A669-0D52-43CF-BFD3-9E36671C979A}"/>
-          </ac:spMkLst>
-        </pc:spChg>
-        <pc:spChg chg="mod">
-          <ac:chgData name="Dr. Manel Puig i Vidal" userId="0d549d0e-cb25-4ad8-b3a5-db046c349dfe" providerId="ADAL" clId="{F5ACA060-5617-4C2B-9B9E-0FDF112D5DD6}" dt="2023-07-17T12:17:17.614" v="28" actId="1076"/>
-          <ac:spMkLst>
-            <pc:docMk/>
-            <pc:sldMk cId="2967436431" sldId="262"/>
-            <ac:spMk id="30" creationId="{E0806900-E02C-4F19-9DF4-14F27003E0A9}"/>
-          </ac:spMkLst>
-        </pc:spChg>
-        <pc:picChg chg="add mod ord">
-          <ac:chgData name="Dr. Manel Puig i Vidal" userId="0d549d0e-cb25-4ad8-b3a5-db046c349dfe" providerId="ADAL" clId="{F5ACA060-5617-4C2B-9B9E-0FDF112D5DD6}" dt="2023-07-17T12:13:25.926" v="13" actId="1076"/>
-          <ac:picMkLst>
-            <pc:docMk/>
-            <pc:sldMk cId="2967436431" sldId="262"/>
-            <ac:picMk id="3" creationId="{0578D19B-E215-BAE6-5AB5-A674798648E2}"/>
+            <ac:picMk id="5" creationId="{D75C9759-8C04-4BDA-AA54-582352963965}"/>
           </ac:picMkLst>
         </pc:picChg>
       </pc:sldChg>
-      <pc:sldChg chg="addSp modSp new mod">
-        <pc:chgData name="Dr. Manel Puig i Vidal" userId="0d549d0e-cb25-4ad8-b3a5-db046c349dfe" providerId="ADAL" clId="{F5ACA060-5617-4C2B-9B9E-0FDF112D5DD6}" dt="2023-07-17T12:12:42.367" v="7" actId="732"/>
+      <pc:sldChg chg="addSp modSp new">
+        <pc:chgData name="Dr. Manel Puig i Vidal" userId="0d549d0e-cb25-4ad8-b3a5-db046c349dfe" providerId="ADAL" clId="{A32D92DA-AB7E-402E-AFA7-3BA5519375E5}" dt="2021-08-03T11:17:31.302" v="16"/>
         <pc:sldMkLst>
           <pc:docMk/>
-          <pc:sldMk cId="2816021084" sldId="265"/>
+          <pc:sldMk cId="4011816797" sldId="264"/>
         </pc:sldMkLst>
         <pc:picChg chg="add mod">
-          <ac:chgData name="Dr. Manel Puig i Vidal" userId="0d549d0e-cb25-4ad8-b3a5-db046c349dfe" providerId="ADAL" clId="{F5ACA060-5617-4C2B-9B9E-0FDF112D5DD6}" dt="2023-07-17T12:12:09.908" v="2" actId="1076"/>
+          <ac:chgData name="Dr. Manel Puig i Vidal" userId="0d549d0e-cb25-4ad8-b3a5-db046c349dfe" providerId="ADAL" clId="{A32D92DA-AB7E-402E-AFA7-3BA5519375E5}" dt="2021-08-03T11:17:31.302" v="16"/>
           <ac:picMkLst>
             <pc:docMk/>
-            <pc:sldMk cId="2816021084" sldId="265"/>
-            <ac:picMk id="2" creationId="{D5C28000-9400-D594-1C16-C516F0A4E7B6}"/>
+            <pc:sldMk cId="4011816797" sldId="264"/>
+            <ac:picMk id="2" creationId="{54008698-7B82-4808-B06A-1C1A72A08D76}"/>
           </ac:picMkLst>
         </pc:picChg>
-        <pc:picChg chg="add mod modCrop">
-          <ac:chgData name="Dr. Manel Puig i Vidal" userId="0d549d0e-cb25-4ad8-b3a5-db046c349dfe" providerId="ADAL" clId="{F5ACA060-5617-4C2B-9B9E-0FDF112D5DD6}" dt="2023-07-17T12:12:42.367" v="7" actId="732"/>
+        <pc:picChg chg="add mod">
+          <ac:chgData name="Dr. Manel Puig i Vidal" userId="0d549d0e-cb25-4ad8-b3a5-db046c349dfe" providerId="ADAL" clId="{A32D92DA-AB7E-402E-AFA7-3BA5519375E5}" dt="2021-08-03T11:17:31.302" v="16"/>
           <ac:picMkLst>
             <pc:docMk/>
-            <pc:sldMk cId="2816021084" sldId="265"/>
-            <ac:picMk id="3" creationId="{BAE887E4-4F3A-65A2-6BB4-D797AD40644A}"/>
+            <pc:sldMk cId="4011816797" sldId="264"/>
+            <ac:picMk id="3" creationId="{0D083199-F003-41EB-9D24-CD4325EB2844}"/>
+          </ac:picMkLst>
+        </pc:picChg>
+        <pc:picChg chg="add mod">
+          <ac:chgData name="Dr. Manel Puig i Vidal" userId="0d549d0e-cb25-4ad8-b3a5-db046c349dfe" providerId="ADAL" clId="{A32D92DA-AB7E-402E-AFA7-3BA5519375E5}" dt="2021-08-03T11:17:31.302" v="16"/>
+          <ac:picMkLst>
+            <pc:docMk/>
+            <pc:sldMk cId="4011816797" sldId="264"/>
+            <ac:picMk id="4" creationId="{6A29C0F2-8F38-447E-A623-B80CDBAF2702}"/>
           </ac:picMkLst>
         </pc:picChg>
       </pc:sldChg>
@@ -970,7 +971,7 @@
           <a:p>
             <a:fld id="{1C047EFF-C005-42C2-96C9-4E7CFE047116}" type="datetimeFigureOut">
               <a:rPr lang="es-ES" smtClean="0"/>
-              <a:t>17/07/2023</a:t>
+              <a:t>26/07/2024</a:t>
             </a:fld>
             <a:endParaRPr lang="es-ES"/>
           </a:p>
@@ -1168,7 +1169,7 @@
           <a:p>
             <a:fld id="{1C047EFF-C005-42C2-96C9-4E7CFE047116}" type="datetimeFigureOut">
               <a:rPr lang="es-ES" smtClean="0"/>
-              <a:t>17/07/2023</a:t>
+              <a:t>26/07/2024</a:t>
             </a:fld>
             <a:endParaRPr lang="es-ES"/>
           </a:p>
@@ -1376,7 +1377,7 @@
           <a:p>
             <a:fld id="{1C047EFF-C005-42C2-96C9-4E7CFE047116}" type="datetimeFigureOut">
               <a:rPr lang="es-ES" smtClean="0"/>
-              <a:t>17/07/2023</a:t>
+              <a:t>26/07/2024</a:t>
             </a:fld>
             <a:endParaRPr lang="es-ES"/>
           </a:p>
@@ -1574,7 +1575,7 @@
           <a:p>
             <a:fld id="{1C047EFF-C005-42C2-96C9-4E7CFE047116}" type="datetimeFigureOut">
               <a:rPr lang="es-ES" smtClean="0"/>
-              <a:t>17/07/2023</a:t>
+              <a:t>26/07/2024</a:t>
             </a:fld>
             <a:endParaRPr lang="es-ES"/>
           </a:p>
@@ -1849,7 +1850,7 @@
           <a:p>
             <a:fld id="{1C047EFF-C005-42C2-96C9-4E7CFE047116}" type="datetimeFigureOut">
               <a:rPr lang="es-ES" smtClean="0"/>
-              <a:t>17/07/2023</a:t>
+              <a:t>26/07/2024</a:t>
             </a:fld>
             <a:endParaRPr lang="es-ES"/>
           </a:p>
@@ -2114,7 +2115,7 @@
           <a:p>
             <a:fld id="{1C047EFF-C005-42C2-96C9-4E7CFE047116}" type="datetimeFigureOut">
               <a:rPr lang="es-ES" smtClean="0"/>
-              <a:t>17/07/2023</a:t>
+              <a:t>26/07/2024</a:t>
             </a:fld>
             <a:endParaRPr lang="es-ES"/>
           </a:p>
@@ -2526,7 +2527,7 @@
           <a:p>
             <a:fld id="{1C047EFF-C005-42C2-96C9-4E7CFE047116}" type="datetimeFigureOut">
               <a:rPr lang="es-ES" smtClean="0"/>
-              <a:t>17/07/2023</a:t>
+              <a:t>26/07/2024</a:t>
             </a:fld>
             <a:endParaRPr lang="es-ES"/>
           </a:p>
@@ -2667,7 +2668,7 @@
           <a:p>
             <a:fld id="{1C047EFF-C005-42C2-96C9-4E7CFE047116}" type="datetimeFigureOut">
               <a:rPr lang="es-ES" smtClean="0"/>
-              <a:t>17/07/2023</a:t>
+              <a:t>26/07/2024</a:t>
             </a:fld>
             <a:endParaRPr lang="es-ES"/>
           </a:p>
@@ -2780,7 +2781,7 @@
           <a:p>
             <a:fld id="{1C047EFF-C005-42C2-96C9-4E7CFE047116}" type="datetimeFigureOut">
               <a:rPr lang="es-ES" smtClean="0"/>
-              <a:t>17/07/2023</a:t>
+              <a:t>26/07/2024</a:t>
             </a:fld>
             <a:endParaRPr lang="es-ES"/>
           </a:p>
@@ -3091,7 +3092,7 @@
           <a:p>
             <a:fld id="{1C047EFF-C005-42C2-96C9-4E7CFE047116}" type="datetimeFigureOut">
               <a:rPr lang="es-ES" smtClean="0"/>
-              <a:t>17/07/2023</a:t>
+              <a:t>26/07/2024</a:t>
             </a:fld>
             <a:endParaRPr lang="es-ES"/>
           </a:p>
@@ -3379,7 +3380,7 @@
           <a:p>
             <a:fld id="{1C047EFF-C005-42C2-96C9-4E7CFE047116}" type="datetimeFigureOut">
               <a:rPr lang="es-ES" smtClean="0"/>
-              <a:t>17/07/2023</a:t>
+              <a:t>26/07/2024</a:t>
             </a:fld>
             <a:endParaRPr lang="es-ES"/>
           </a:p>
@@ -3620,7 +3621,7 @@
           <a:p>
             <a:fld id="{1C047EFF-C005-42C2-96C9-4E7CFE047116}" type="datetimeFigureOut">
               <a:rPr lang="es-ES" smtClean="0"/>
-              <a:t>17/07/2023</a:t>
+              <a:t>26/07/2024</a:t>
             </a:fld>
             <a:endParaRPr lang="es-ES"/>
           </a:p>
@@ -7508,528 +7509,12 @@
           <a:chExt cx="0" cy="0"/>
         </a:xfrm>
       </p:grpSpPr>
-      <p:sp>
-        <p:nvSpPr>
-          <p:cNvPr id="2" name="Elipse 1">
-            <a:extLst>
-              <a:ext uri="{FF2B5EF4-FFF2-40B4-BE49-F238E27FC236}">
-                <a16:creationId xmlns:a16="http://schemas.microsoft.com/office/drawing/2014/main" id="{082D705F-B680-40D4-86A6-5834E21B310B}"/>
-              </a:ext>
-            </a:extLst>
-          </p:cNvPr>
-          <p:cNvSpPr/>
-          <p:nvPr/>
-        </p:nvSpPr>
-        <p:spPr>
-          <a:xfrm>
-            <a:off x="136523" y="663073"/>
-            <a:ext cx="2490132" cy="1609046"/>
-          </a:xfrm>
-          <a:prstGeom prst="ellipse">
-            <a:avLst/>
-          </a:prstGeom>
-          <a:noFill/>
-          <a:ln w="38100"/>
-        </p:spPr>
-        <p:style>
-          <a:lnRef idx="2">
-            <a:schemeClr val="accent1">
-              <a:shade val="50000"/>
-            </a:schemeClr>
-          </a:lnRef>
-          <a:fillRef idx="1">
-            <a:schemeClr val="accent1"/>
-          </a:fillRef>
-          <a:effectRef idx="0">
-            <a:schemeClr val="accent1"/>
-          </a:effectRef>
-          <a:fontRef idx="minor">
-            <a:schemeClr val="lt1"/>
-          </a:fontRef>
-        </p:style>
-        <p:txBody>
-          <a:bodyPr rtlCol="0" anchor="ctr"/>
-          <a:lstStyle/>
-          <a:p>
-            <a:pPr algn="ctr"/>
-            <a:endParaRPr lang="es-ES" dirty="0"/>
-          </a:p>
-        </p:txBody>
-      </p:sp>
-      <p:sp>
-        <p:nvSpPr>
-          <p:cNvPr id="3" name="CuadroTexto 2">
-            <a:extLst>
-              <a:ext uri="{FF2B5EF4-FFF2-40B4-BE49-F238E27FC236}">
-                <a16:creationId xmlns:a16="http://schemas.microsoft.com/office/drawing/2014/main" id="{BCB67200-2B31-4932-AD48-4CCDC87F647B}"/>
-              </a:ext>
-            </a:extLst>
-          </p:cNvPr>
-          <p:cNvSpPr txBox="1"/>
-          <p:nvPr/>
-        </p:nvSpPr>
-        <p:spPr>
-          <a:xfrm>
-            <a:off x="511164" y="1202891"/>
-            <a:ext cx="1805046" cy="461665"/>
-          </a:xfrm>
-          <a:prstGeom prst="rect">
-            <a:avLst/>
-          </a:prstGeom>
-          <a:noFill/>
-        </p:spPr>
-        <p:txBody>
-          <a:bodyPr wrap="none" rtlCol="0">
-            <a:spAutoFit/>
-          </a:bodyPr>
-          <a:lstStyle/>
-          <a:p>
-            <a:r>
-              <a:rPr lang="ca-ES" sz="2400" b="1" dirty="0">
-                <a:solidFill>
-                  <a:schemeClr val="accent1">
-                    <a:lumMod val="50000"/>
-                  </a:schemeClr>
-                </a:solidFill>
-              </a:rPr>
-              <a:t>/serial_node</a:t>
-            </a:r>
-            <a:endParaRPr lang="es-ES" sz="2400" b="1" dirty="0">
-              <a:solidFill>
-                <a:schemeClr val="accent1">
-                  <a:lumMod val="50000"/>
-                </a:schemeClr>
-              </a:solidFill>
-            </a:endParaRPr>
-          </a:p>
-        </p:txBody>
-      </p:sp>
-      <p:sp>
-        <p:nvSpPr>
-          <p:cNvPr id="4" name="Arco 3">
-            <a:extLst>
-              <a:ext uri="{FF2B5EF4-FFF2-40B4-BE49-F238E27FC236}">
-                <a16:creationId xmlns:a16="http://schemas.microsoft.com/office/drawing/2014/main" id="{107760A7-7D18-40EE-8EE2-54563CD92C8E}"/>
-              </a:ext>
-            </a:extLst>
-          </p:cNvPr>
-          <p:cNvSpPr/>
-          <p:nvPr/>
-        </p:nvSpPr>
-        <p:spPr>
-          <a:xfrm>
-            <a:off x="1499317" y="1509697"/>
-            <a:ext cx="2192785" cy="1743268"/>
-          </a:xfrm>
-          <a:prstGeom prst="arc">
-            <a:avLst>
-              <a:gd name="adj1" fmla="val 16328987"/>
-              <a:gd name="adj2" fmla="val 21441347"/>
-            </a:avLst>
-          </a:prstGeom>
-          <a:noFill/>
-          <a:ln w="38100">
-            <a:solidFill>
-              <a:srgbClr val="FF0000"/>
-            </a:solidFill>
-            <a:headEnd type="none" w="med" len="med"/>
-            <a:tailEnd type="triangle" w="med" len="med"/>
-          </a:ln>
-        </p:spPr>
-        <p:style>
-          <a:lnRef idx="1">
-            <a:schemeClr val="accent1"/>
-          </a:lnRef>
-          <a:fillRef idx="0">
-            <a:schemeClr val="accent1"/>
-          </a:fillRef>
-          <a:effectRef idx="0">
-            <a:schemeClr val="accent1"/>
-          </a:effectRef>
-          <a:fontRef idx="minor">
-            <a:schemeClr val="tx1"/>
-          </a:fontRef>
-        </p:style>
-        <p:txBody>
-          <a:bodyPr rtlCol="0" anchor="ctr"/>
-          <a:lstStyle/>
-          <a:p>
-            <a:pPr algn="ctr"/>
-            <a:endParaRPr lang="es-ES"/>
-          </a:p>
-        </p:txBody>
-      </p:sp>
-      <p:sp>
-        <p:nvSpPr>
-          <p:cNvPr id="5" name="CuadroTexto 4">
-            <a:extLst>
-              <a:ext uri="{FF2B5EF4-FFF2-40B4-BE49-F238E27FC236}">
-                <a16:creationId xmlns:a16="http://schemas.microsoft.com/office/drawing/2014/main" id="{1759DE4C-A082-48D5-9FAF-103D09A22282}"/>
-              </a:ext>
-            </a:extLst>
-          </p:cNvPr>
-          <p:cNvSpPr txBox="1"/>
-          <p:nvPr/>
-        </p:nvSpPr>
-        <p:spPr>
-          <a:xfrm>
-            <a:off x="2847950" y="779113"/>
-            <a:ext cx="2460161" cy="461665"/>
-          </a:xfrm>
-          <a:prstGeom prst="rect">
-            <a:avLst/>
-          </a:prstGeom>
-          <a:noFill/>
-        </p:spPr>
-        <p:txBody>
-          <a:bodyPr wrap="none" rtlCol="0">
-            <a:spAutoFit/>
-          </a:bodyPr>
-          <a:lstStyle/>
-          <a:p>
-            <a:r>
-              <a:rPr lang="ca-ES" sz="2400" b="1" dirty="0">
-                <a:solidFill>
-                  <a:srgbClr val="FF0000"/>
-                </a:solidFill>
-              </a:rPr>
-              <a:t>/pen_ orientation</a:t>
-            </a:r>
-            <a:endParaRPr lang="es-ES" sz="2400" b="1" dirty="0">
-              <a:solidFill>
-                <a:srgbClr val="FF0000"/>
-              </a:solidFill>
-            </a:endParaRPr>
-          </a:p>
-        </p:txBody>
-      </p:sp>
-      <p:sp>
-        <p:nvSpPr>
-          <p:cNvPr id="6" name="CuadroTexto 5">
-            <a:extLst>
-              <a:ext uri="{FF2B5EF4-FFF2-40B4-BE49-F238E27FC236}">
-                <a16:creationId xmlns:a16="http://schemas.microsoft.com/office/drawing/2014/main" id="{34E02DBB-0AAF-4E19-8537-717874847601}"/>
-              </a:ext>
-            </a:extLst>
-          </p:cNvPr>
-          <p:cNvSpPr txBox="1"/>
-          <p:nvPr/>
-        </p:nvSpPr>
-        <p:spPr>
-          <a:xfrm>
-            <a:off x="2763260" y="1193469"/>
-            <a:ext cx="2012089" cy="307777"/>
-          </a:xfrm>
-          <a:prstGeom prst="rect">
-            <a:avLst/>
-          </a:prstGeom>
-          <a:noFill/>
-        </p:spPr>
-        <p:txBody>
-          <a:bodyPr wrap="none" rtlCol="0">
-            <a:spAutoFit/>
-          </a:bodyPr>
-          <a:lstStyle/>
-          <a:p>
-            <a:r>
-              <a:rPr lang="es-ES" sz="1400" i="0" dirty="0">
-                <a:solidFill>
-                  <a:srgbClr val="333333"/>
-                </a:solidFill>
-                <a:effectLst/>
-                <a:latin typeface="Arial Narrow" panose="020B0606020202030204" pitchFamily="34" charset="0"/>
-              </a:rPr>
-              <a:t>std_msgs/Float32MultiArray</a:t>
-            </a:r>
-          </a:p>
-        </p:txBody>
-      </p:sp>
-      <p:sp>
-        <p:nvSpPr>
-          <p:cNvPr id="7" name="CuadroTexto 6">
-            <a:extLst>
-              <a:ext uri="{FF2B5EF4-FFF2-40B4-BE49-F238E27FC236}">
-                <a16:creationId xmlns:a16="http://schemas.microsoft.com/office/drawing/2014/main" id="{F91173A7-4C62-4CE0-B2D1-79776A8704EC}"/>
-              </a:ext>
-            </a:extLst>
-          </p:cNvPr>
-          <p:cNvSpPr txBox="1"/>
-          <p:nvPr/>
-        </p:nvSpPr>
-        <p:spPr>
-          <a:xfrm>
-            <a:off x="1407925" y="2254554"/>
-            <a:ext cx="1696298" cy="400110"/>
-          </a:xfrm>
-          <a:prstGeom prst="rect">
-            <a:avLst/>
-          </a:prstGeom>
-          <a:noFill/>
-        </p:spPr>
-        <p:txBody>
-          <a:bodyPr wrap="none" rtlCol="0">
-            <a:spAutoFit/>
-          </a:bodyPr>
-          <a:lstStyle/>
-          <a:p>
-            <a:r>
-              <a:rPr lang="ca-ES" sz="2000" b="1" dirty="0">
-                <a:solidFill>
-                  <a:srgbClr val="FF0000"/>
-                </a:solidFill>
-              </a:rPr>
-              <a:t>/pen_position</a:t>
-            </a:r>
-            <a:endParaRPr lang="es-ES" sz="2000" b="1" dirty="0">
-              <a:solidFill>
-                <a:srgbClr val="FF0000"/>
-              </a:solidFill>
-            </a:endParaRPr>
-          </a:p>
-        </p:txBody>
-      </p:sp>
-      <p:sp>
-        <p:nvSpPr>
-          <p:cNvPr id="8" name="CuadroTexto 7">
-            <a:extLst>
-              <a:ext uri="{FF2B5EF4-FFF2-40B4-BE49-F238E27FC236}">
-                <a16:creationId xmlns:a16="http://schemas.microsoft.com/office/drawing/2014/main" id="{8B393CB0-29F4-4CCA-B1B6-39A84961828C}"/>
-              </a:ext>
-            </a:extLst>
-          </p:cNvPr>
-          <p:cNvSpPr txBox="1"/>
-          <p:nvPr/>
-        </p:nvSpPr>
-        <p:spPr>
-          <a:xfrm>
-            <a:off x="1611983" y="2570667"/>
-            <a:ext cx="1151277" cy="307777"/>
-          </a:xfrm>
-          <a:prstGeom prst="rect">
-            <a:avLst/>
-          </a:prstGeom>
-          <a:noFill/>
-        </p:spPr>
-        <p:txBody>
-          <a:bodyPr wrap="none" rtlCol="0">
-            <a:spAutoFit/>
-          </a:bodyPr>
-          <a:lstStyle/>
-          <a:p>
-            <a:r>
-              <a:rPr lang="es-ES" sz="1400" i="0" dirty="0">
-                <a:solidFill>
-                  <a:srgbClr val="333333"/>
-                </a:solidFill>
-                <a:effectLst/>
-                <a:latin typeface="Arial Narrow" panose="020B0606020202030204" pitchFamily="34" charset="0"/>
-              </a:rPr>
-              <a:t>std_msgs/Bool</a:t>
-            </a:r>
-          </a:p>
-        </p:txBody>
-      </p:sp>
-      <p:sp>
-        <p:nvSpPr>
-          <p:cNvPr id="9" name="Arco 8">
-            <a:extLst>
-              <a:ext uri="{FF2B5EF4-FFF2-40B4-BE49-F238E27FC236}">
-                <a16:creationId xmlns:a16="http://schemas.microsoft.com/office/drawing/2014/main" id="{EC69BDAB-87E6-4DFE-836E-67A50C82F606}"/>
-              </a:ext>
-            </a:extLst>
-          </p:cNvPr>
-          <p:cNvSpPr/>
-          <p:nvPr/>
-        </p:nvSpPr>
-        <p:spPr>
-          <a:xfrm>
-            <a:off x="1316327" y="1327207"/>
-            <a:ext cx="2192785" cy="1849786"/>
-          </a:xfrm>
-          <a:prstGeom prst="arc">
-            <a:avLst>
-              <a:gd name="adj1" fmla="val 4588707"/>
-              <a:gd name="adj2" fmla="val 10721593"/>
-            </a:avLst>
-          </a:prstGeom>
-          <a:noFill/>
-          <a:ln w="38100">
-            <a:solidFill>
-              <a:srgbClr val="FF0000"/>
-            </a:solidFill>
-            <a:headEnd type="triangle" w="med" len="med"/>
-            <a:tailEnd type="none" w="med" len="med"/>
-          </a:ln>
-        </p:spPr>
-        <p:style>
-          <a:lnRef idx="1">
-            <a:schemeClr val="accent1"/>
-          </a:lnRef>
-          <a:fillRef idx="0">
-            <a:schemeClr val="accent1"/>
-          </a:fillRef>
-          <a:effectRef idx="0">
-            <a:schemeClr val="accent1"/>
-          </a:effectRef>
-          <a:fontRef idx="minor">
-            <a:schemeClr val="tx1"/>
-          </a:fontRef>
-        </p:style>
-        <p:txBody>
-          <a:bodyPr rtlCol="0" anchor="ctr"/>
-          <a:lstStyle/>
-          <a:p>
-            <a:pPr algn="ctr"/>
-            <a:endParaRPr lang="es-ES"/>
-          </a:p>
-        </p:txBody>
-      </p:sp>
-      <p:sp>
-        <p:nvSpPr>
-          <p:cNvPr id="10" name="CuadroTexto 9">
-            <a:extLst>
-              <a:ext uri="{FF2B5EF4-FFF2-40B4-BE49-F238E27FC236}">
-                <a16:creationId xmlns:a16="http://schemas.microsoft.com/office/drawing/2014/main" id="{0F954DF0-49BD-4C90-BFC7-9A952FD634E0}"/>
-              </a:ext>
-            </a:extLst>
-          </p:cNvPr>
-          <p:cNvSpPr txBox="1"/>
-          <p:nvPr/>
-        </p:nvSpPr>
-        <p:spPr>
-          <a:xfrm>
-            <a:off x="728240" y="3594427"/>
-            <a:ext cx="1430200" cy="400110"/>
-          </a:xfrm>
-          <a:prstGeom prst="rect">
-            <a:avLst/>
-          </a:prstGeom>
-          <a:noFill/>
-        </p:spPr>
-        <p:txBody>
-          <a:bodyPr wrap="none" rtlCol="0">
-            <a:spAutoFit/>
-          </a:bodyPr>
-          <a:lstStyle/>
-          <a:p>
-            <a:r>
-              <a:rPr lang="ca-ES" sz="2000" b="1" dirty="0">
-                <a:solidFill>
-                  <a:srgbClr val="FF0000"/>
-                </a:solidFill>
-              </a:rPr>
-              <a:t>/pen_ open</a:t>
-            </a:r>
-            <a:endParaRPr lang="es-ES" sz="2000" b="1" dirty="0">
-              <a:solidFill>
-                <a:srgbClr val="FF0000"/>
-              </a:solidFill>
-            </a:endParaRPr>
-          </a:p>
-        </p:txBody>
-      </p:sp>
-      <p:sp>
-        <p:nvSpPr>
-          <p:cNvPr id="11" name="CuadroTexto 10">
-            <a:extLst>
-              <a:ext uri="{FF2B5EF4-FFF2-40B4-BE49-F238E27FC236}">
-                <a16:creationId xmlns:a16="http://schemas.microsoft.com/office/drawing/2014/main" id="{E10FDC63-473F-4A5D-BCBF-17BAD1F351CE}"/>
-              </a:ext>
-            </a:extLst>
-          </p:cNvPr>
-          <p:cNvSpPr txBox="1"/>
-          <p:nvPr/>
-        </p:nvSpPr>
-        <p:spPr>
-          <a:xfrm>
-            <a:off x="898071" y="3934586"/>
-            <a:ext cx="1151277" cy="307777"/>
-          </a:xfrm>
-          <a:prstGeom prst="rect">
-            <a:avLst/>
-          </a:prstGeom>
-          <a:noFill/>
-        </p:spPr>
-        <p:txBody>
-          <a:bodyPr wrap="none" rtlCol="0">
-            <a:spAutoFit/>
-          </a:bodyPr>
-          <a:lstStyle/>
-          <a:p>
-            <a:r>
-              <a:rPr lang="es-ES" sz="1400" i="0" dirty="0">
-                <a:solidFill>
-                  <a:srgbClr val="333333"/>
-                </a:solidFill>
-                <a:effectLst/>
-                <a:latin typeface="Arial Narrow" panose="020B0606020202030204" pitchFamily="34" charset="0"/>
-              </a:rPr>
-              <a:t>std_msgs/Bool</a:t>
-            </a:r>
-          </a:p>
-        </p:txBody>
-      </p:sp>
-      <p:sp>
-        <p:nvSpPr>
-          <p:cNvPr id="12" name="Arco 11">
-            <a:extLst>
-              <a:ext uri="{FF2B5EF4-FFF2-40B4-BE49-F238E27FC236}">
-                <a16:creationId xmlns:a16="http://schemas.microsoft.com/office/drawing/2014/main" id="{F5FFBDCA-E0FE-4686-8855-14B98D65EC2F}"/>
-              </a:ext>
-            </a:extLst>
-          </p:cNvPr>
-          <p:cNvSpPr/>
-          <p:nvPr/>
-        </p:nvSpPr>
-        <p:spPr>
-          <a:xfrm>
-            <a:off x="772920" y="1174804"/>
-            <a:ext cx="3710413" cy="2572209"/>
-          </a:xfrm>
-          <a:prstGeom prst="arc">
-            <a:avLst>
-              <a:gd name="adj1" fmla="val 4588707"/>
-              <a:gd name="adj2" fmla="val 11290737"/>
-            </a:avLst>
-          </a:prstGeom>
-          <a:noFill/>
-          <a:ln w="38100">
-            <a:solidFill>
-              <a:srgbClr val="FF0000"/>
-            </a:solidFill>
-            <a:headEnd type="triangle" w="med" len="med"/>
-            <a:tailEnd type="none" w="med" len="med"/>
-          </a:ln>
-        </p:spPr>
-        <p:style>
-          <a:lnRef idx="1">
-            <a:schemeClr val="accent1"/>
-          </a:lnRef>
-          <a:fillRef idx="0">
-            <a:schemeClr val="accent1"/>
-          </a:fillRef>
-          <a:effectRef idx="0">
-            <a:schemeClr val="accent1"/>
-          </a:effectRef>
-          <a:fontRef idx="minor">
-            <a:schemeClr val="tx1"/>
-          </a:fontRef>
-        </p:style>
-        <p:txBody>
-          <a:bodyPr rtlCol="0" anchor="ctr"/>
-          <a:lstStyle/>
-          <a:p>
-            <a:pPr algn="ctr"/>
-            <a:endParaRPr lang="es-ES"/>
-          </a:p>
-        </p:txBody>
-      </p:sp>
       <p:pic>
         <p:nvPicPr>
-          <p:cNvPr id="13" name="Imagen 12">
-            <a:extLst>
-              <a:ext uri="{FF2B5EF4-FFF2-40B4-BE49-F238E27FC236}">
-                <a16:creationId xmlns:a16="http://schemas.microsoft.com/office/drawing/2014/main" id="{8290C259-8BD6-4754-B849-FA2E21EA864F}"/>
+          <p:cNvPr id="2" name="Picture 1">
+            <a:extLst>
+              <a:ext uri="{FF2B5EF4-FFF2-40B4-BE49-F238E27FC236}">
+                <a16:creationId xmlns:a16="http://schemas.microsoft.com/office/drawing/2014/main" id="{D5C28000-9400-D594-1C16-C516F0A4E7B6}"/>
               </a:ext>
             </a:extLst>
           </p:cNvPr>
@@ -8046,8 +7531,37 @@
         </p:blipFill>
         <p:spPr>
           <a:xfrm>
-            <a:off x="489798" y="5069806"/>
-            <a:ext cx="1516617" cy="828073"/>
+            <a:off x="812800" y="618067"/>
+            <a:ext cx="4572000" cy="4572000"/>
+          </a:xfrm>
+          <a:prstGeom prst="rect">
+            <a:avLst/>
+          </a:prstGeom>
+        </p:spPr>
+      </p:pic>
+      <p:pic>
+        <p:nvPicPr>
+          <p:cNvPr id="3" name="Picture 2">
+            <a:extLst>
+              <a:ext uri="{FF2B5EF4-FFF2-40B4-BE49-F238E27FC236}">
+                <a16:creationId xmlns:a16="http://schemas.microsoft.com/office/drawing/2014/main" id="{BAE887E4-4F3A-65A2-6BB4-D797AD40644A}"/>
+              </a:ext>
+            </a:extLst>
+          </p:cNvPr>
+          <p:cNvPicPr>
+            <a:picLocks noChangeAspect="1"/>
+          </p:cNvPicPr>
+          <p:nvPr/>
+        </p:nvPicPr>
+        <p:blipFill rotWithShape="1">
+          <a:blip r:embed="rId2"/>
+          <a:srcRect l="11637" t="54557" r="7573" b="2977"/>
+          <a:stretch/>
+        </p:blipFill>
+        <p:spPr>
+          <a:xfrm>
+            <a:off x="7339263" y="3248526"/>
+            <a:ext cx="3693696" cy="1941541"/>
           </a:xfrm>
           <a:prstGeom prst="rect">
             <a:avLst/>
@@ -8057,7 +7571,7 @@
     </p:spTree>
     <p:extLst>
       <p:ext uri="{BB962C8B-B14F-4D97-AF65-F5344CB8AC3E}">
-        <p14:creationId xmlns:p14="http://schemas.microsoft.com/office/powerpoint/2010/main" val="4034178708"/>
+        <p14:creationId xmlns:p14="http://schemas.microsoft.com/office/powerpoint/2010/main" val="2816021084"/>
       </p:ext>
     </p:extLst>
   </p:cSld>
@@ -8084,12 +7598,1009 @@
           <a:chExt cx="0" cy="0"/>
         </a:xfrm>
       </p:grpSpPr>
+      <p:cxnSp>
+        <p:nvCxnSpPr>
+          <p:cNvPr id="7" name="Conector recto de flecha 6">
+            <a:extLst>
+              <a:ext uri="{FF2B5EF4-FFF2-40B4-BE49-F238E27FC236}">
+                <a16:creationId xmlns:a16="http://schemas.microsoft.com/office/drawing/2014/main" id="{5DA8BA08-98F3-4B12-AB35-10F82E63D7D0}"/>
+              </a:ext>
+            </a:extLst>
+          </p:cNvPr>
+          <p:cNvCxnSpPr>
+            <a:cxnSpLocks/>
+          </p:cNvCxnSpPr>
+          <p:nvPr/>
+        </p:nvCxnSpPr>
+        <p:spPr>
+          <a:xfrm>
+            <a:off x="4619023" y="4301120"/>
+            <a:ext cx="2341309" cy="1"/>
+          </a:xfrm>
+          <a:prstGeom prst="straightConnector1">
+            <a:avLst/>
+          </a:prstGeom>
+          <a:ln w="57150">
+            <a:solidFill>
+              <a:srgbClr val="FF0000"/>
+            </a:solidFill>
+            <a:tailEnd type="triangle"/>
+          </a:ln>
+        </p:spPr>
+        <p:style>
+          <a:lnRef idx="1">
+            <a:schemeClr val="accent1"/>
+          </a:lnRef>
+          <a:fillRef idx="0">
+            <a:schemeClr val="accent1"/>
+          </a:fillRef>
+          <a:effectRef idx="0">
+            <a:schemeClr val="accent1"/>
+          </a:effectRef>
+          <a:fontRef idx="minor">
+            <a:schemeClr val="tx1"/>
+          </a:fontRef>
+        </p:style>
+      </p:cxnSp>
+      <p:sp>
+        <p:nvSpPr>
+          <p:cNvPr id="8" name="Elipse 7">
+            <a:extLst>
+              <a:ext uri="{FF2B5EF4-FFF2-40B4-BE49-F238E27FC236}">
+                <a16:creationId xmlns:a16="http://schemas.microsoft.com/office/drawing/2014/main" id="{99244EB1-158A-4D55-98F4-172650970AF5}"/>
+              </a:ext>
+            </a:extLst>
+          </p:cNvPr>
+          <p:cNvSpPr/>
+          <p:nvPr/>
+        </p:nvSpPr>
+        <p:spPr>
+          <a:xfrm>
+            <a:off x="6960332" y="3396246"/>
+            <a:ext cx="3200400" cy="1809750"/>
+          </a:xfrm>
+          <a:prstGeom prst="ellipse">
+            <a:avLst/>
+          </a:prstGeom>
+          <a:noFill/>
+          <a:ln w="38100"/>
+        </p:spPr>
+        <p:style>
+          <a:lnRef idx="2">
+            <a:schemeClr val="accent1">
+              <a:shade val="50000"/>
+            </a:schemeClr>
+          </a:lnRef>
+          <a:fillRef idx="1">
+            <a:schemeClr val="accent1"/>
+          </a:fillRef>
+          <a:effectRef idx="0">
+            <a:schemeClr val="accent1"/>
+          </a:effectRef>
+          <a:fontRef idx="minor">
+            <a:schemeClr val="lt1"/>
+          </a:fontRef>
+        </p:style>
+        <p:txBody>
+          <a:bodyPr rtlCol="0" anchor="ctr"/>
+          <a:lstStyle/>
+          <a:p>
+            <a:pPr algn="ctr"/>
+            <a:endParaRPr lang="es-ES" dirty="0"/>
+          </a:p>
+        </p:txBody>
+      </p:sp>
+      <p:sp>
+        <p:nvSpPr>
+          <p:cNvPr id="10" name="CuadroTexto 9">
+            <a:extLst>
+              <a:ext uri="{FF2B5EF4-FFF2-40B4-BE49-F238E27FC236}">
+                <a16:creationId xmlns:a16="http://schemas.microsoft.com/office/drawing/2014/main" id="{259A914E-1F70-4883-A69A-B870D4892089}"/>
+              </a:ext>
+            </a:extLst>
+          </p:cNvPr>
+          <p:cNvSpPr txBox="1"/>
+          <p:nvPr/>
+        </p:nvSpPr>
+        <p:spPr>
+          <a:xfrm>
+            <a:off x="4987170" y="5529765"/>
+            <a:ext cx="1056379" cy="461665"/>
+          </a:xfrm>
+          <a:prstGeom prst="rect">
+            <a:avLst/>
+          </a:prstGeom>
+          <a:noFill/>
+        </p:spPr>
+        <p:txBody>
+          <a:bodyPr wrap="none" rtlCol="0">
+            <a:spAutoFit/>
+          </a:bodyPr>
+          <a:lstStyle/>
+          <a:p>
+            <a:r>
+              <a:rPr lang="ca-ES" sz="2400" b="1" dirty="0">
+                <a:solidFill>
+                  <a:srgbClr val="FF0000"/>
+                </a:solidFill>
+              </a:rPr>
+              <a:t>/odom</a:t>
+            </a:r>
+            <a:endParaRPr lang="es-ES" sz="2400" b="1" dirty="0">
+              <a:solidFill>
+                <a:srgbClr val="FF0000"/>
+              </a:solidFill>
+            </a:endParaRPr>
+          </a:p>
+        </p:txBody>
+      </p:sp>
+      <p:sp>
+        <p:nvSpPr>
+          <p:cNvPr id="14" name="CuadroTexto 13">
+            <a:extLst>
+              <a:ext uri="{FF2B5EF4-FFF2-40B4-BE49-F238E27FC236}">
+                <a16:creationId xmlns:a16="http://schemas.microsoft.com/office/drawing/2014/main" id="{9161A82D-A686-4891-97C0-0F9A0D104E76}"/>
+              </a:ext>
+            </a:extLst>
+          </p:cNvPr>
+          <p:cNvSpPr txBox="1"/>
+          <p:nvPr/>
+        </p:nvSpPr>
+        <p:spPr>
+          <a:xfrm>
+            <a:off x="4734846" y="6472207"/>
+            <a:ext cx="2373278" cy="400110"/>
+          </a:xfrm>
+          <a:prstGeom prst="rect">
+            <a:avLst/>
+          </a:prstGeom>
+          <a:noFill/>
+        </p:spPr>
+        <p:txBody>
+          <a:bodyPr wrap="none" rtlCol="0">
+            <a:spAutoFit/>
+          </a:bodyPr>
+          <a:lstStyle/>
+          <a:p>
+            <a:r>
+              <a:rPr lang="ca-ES" sz="2000" dirty="0"/>
+              <a:t>nav_msgs/Odometry</a:t>
+            </a:r>
+            <a:endParaRPr lang="es-ES" sz="2000" dirty="0"/>
+          </a:p>
+        </p:txBody>
+      </p:sp>
+      <p:sp>
+        <p:nvSpPr>
+          <p:cNvPr id="23" name="Elipse 22">
+            <a:extLst>
+              <a:ext uri="{FF2B5EF4-FFF2-40B4-BE49-F238E27FC236}">
+                <a16:creationId xmlns:a16="http://schemas.microsoft.com/office/drawing/2014/main" id="{617D49E2-3C3E-4EBD-B410-AE440494B041}"/>
+              </a:ext>
+            </a:extLst>
+          </p:cNvPr>
+          <p:cNvSpPr/>
+          <p:nvPr/>
+        </p:nvSpPr>
+        <p:spPr>
+          <a:xfrm>
+            <a:off x="1368308" y="3375609"/>
+            <a:ext cx="3200400" cy="1809750"/>
+          </a:xfrm>
+          <a:prstGeom prst="ellipse">
+            <a:avLst/>
+          </a:prstGeom>
+          <a:noFill/>
+          <a:ln w="38100"/>
+        </p:spPr>
+        <p:style>
+          <a:lnRef idx="2">
+            <a:schemeClr val="accent1">
+              <a:shade val="50000"/>
+            </a:schemeClr>
+          </a:lnRef>
+          <a:fillRef idx="1">
+            <a:schemeClr val="accent1"/>
+          </a:fillRef>
+          <a:effectRef idx="0">
+            <a:schemeClr val="accent1"/>
+          </a:effectRef>
+          <a:fontRef idx="minor">
+            <a:schemeClr val="lt1"/>
+          </a:fontRef>
+        </p:style>
+        <p:txBody>
+          <a:bodyPr rtlCol="0" anchor="ctr"/>
+          <a:lstStyle/>
+          <a:p>
+            <a:pPr algn="ctr"/>
+            <a:endParaRPr lang="es-ES" dirty="0"/>
+          </a:p>
+        </p:txBody>
+      </p:sp>
+      <p:sp>
+        <p:nvSpPr>
+          <p:cNvPr id="24" name="CuadroTexto 23">
+            <a:extLst>
+              <a:ext uri="{FF2B5EF4-FFF2-40B4-BE49-F238E27FC236}">
+                <a16:creationId xmlns:a16="http://schemas.microsoft.com/office/drawing/2014/main" id="{0D51F148-C3ED-488F-891C-0612BB15BE7C}"/>
+              </a:ext>
+            </a:extLst>
+          </p:cNvPr>
+          <p:cNvSpPr txBox="1"/>
+          <p:nvPr/>
+        </p:nvSpPr>
+        <p:spPr>
+          <a:xfrm>
+            <a:off x="1932594" y="2703015"/>
+            <a:ext cx="987771" cy="523220"/>
+          </a:xfrm>
+          <a:prstGeom prst="rect">
+            <a:avLst/>
+          </a:prstGeom>
+          <a:noFill/>
+        </p:spPr>
+        <p:txBody>
+          <a:bodyPr wrap="none" rtlCol="0">
+            <a:spAutoFit/>
+          </a:bodyPr>
+          <a:lstStyle/>
+          <a:p>
+            <a:r>
+              <a:rPr lang="ca-ES" sz="2800" b="1" dirty="0"/>
+              <a:t>Node</a:t>
+            </a:r>
+            <a:endParaRPr lang="es-ES" sz="2800" b="1" dirty="0"/>
+          </a:p>
+        </p:txBody>
+      </p:sp>
+      <p:sp>
+        <p:nvSpPr>
+          <p:cNvPr id="25" name="CuadroTexto 24">
+            <a:extLst>
+              <a:ext uri="{FF2B5EF4-FFF2-40B4-BE49-F238E27FC236}">
+                <a16:creationId xmlns:a16="http://schemas.microsoft.com/office/drawing/2014/main" id="{C2A1462F-3A2F-49F3-91FD-8F6DAE4CBF17}"/>
+              </a:ext>
+            </a:extLst>
+          </p:cNvPr>
+          <p:cNvSpPr txBox="1"/>
+          <p:nvPr/>
+        </p:nvSpPr>
+        <p:spPr>
+          <a:xfrm>
+            <a:off x="1831991" y="4001525"/>
+            <a:ext cx="1934889" cy="523220"/>
+          </a:xfrm>
+          <a:prstGeom prst="rect">
+            <a:avLst/>
+          </a:prstGeom>
+          <a:noFill/>
+        </p:spPr>
+        <p:txBody>
+          <a:bodyPr wrap="none" rtlCol="0">
+            <a:spAutoFit/>
+          </a:bodyPr>
+          <a:lstStyle/>
+          <a:p>
+            <a:r>
+              <a:rPr lang="ca-ES" sz="2800" b="1" dirty="0">
+                <a:solidFill>
+                  <a:schemeClr val="accent1">
+                    <a:lumMod val="50000"/>
+                  </a:schemeClr>
+                </a:solidFill>
+              </a:rPr>
+              <a:t>/rUBot_nav</a:t>
+            </a:r>
+            <a:endParaRPr lang="es-ES" sz="2800" b="1" dirty="0">
+              <a:solidFill>
+                <a:schemeClr val="accent1">
+                  <a:lumMod val="50000"/>
+                </a:schemeClr>
+              </a:solidFill>
+            </a:endParaRPr>
+          </a:p>
+        </p:txBody>
+      </p:sp>
+      <p:sp>
+        <p:nvSpPr>
+          <p:cNvPr id="9" name="Arco 8">
+            <a:extLst>
+              <a:ext uri="{FF2B5EF4-FFF2-40B4-BE49-F238E27FC236}">
+                <a16:creationId xmlns:a16="http://schemas.microsoft.com/office/drawing/2014/main" id="{4EF9ABCA-B3F2-4552-B45F-5E1D4718C8CD}"/>
+              </a:ext>
+            </a:extLst>
+          </p:cNvPr>
+          <p:cNvSpPr/>
+          <p:nvPr/>
+        </p:nvSpPr>
+        <p:spPr>
+          <a:xfrm>
+            <a:off x="3320177" y="4051176"/>
+            <a:ext cx="4905829" cy="2250421"/>
+          </a:xfrm>
+          <a:prstGeom prst="arc">
+            <a:avLst>
+              <a:gd name="adj1" fmla="val 21571653"/>
+              <a:gd name="adj2" fmla="val 10781742"/>
+            </a:avLst>
+          </a:prstGeom>
+          <a:noFill/>
+          <a:ln w="57150">
+            <a:solidFill>
+              <a:srgbClr val="FF0000"/>
+            </a:solidFill>
+            <a:headEnd type="none" w="med" len="med"/>
+            <a:tailEnd type="triangle" w="med" len="med"/>
+          </a:ln>
+        </p:spPr>
+        <p:style>
+          <a:lnRef idx="1">
+            <a:schemeClr val="accent1"/>
+          </a:lnRef>
+          <a:fillRef idx="0">
+            <a:schemeClr val="accent1"/>
+          </a:fillRef>
+          <a:effectRef idx="0">
+            <a:schemeClr val="accent1"/>
+          </a:effectRef>
+          <a:fontRef idx="minor">
+            <a:schemeClr val="tx1"/>
+          </a:fontRef>
+        </p:style>
+        <p:txBody>
+          <a:bodyPr rtlCol="0" anchor="ctr"/>
+          <a:lstStyle/>
+          <a:p>
+            <a:pPr algn="ctr"/>
+            <a:endParaRPr lang="es-ES"/>
+          </a:p>
+        </p:txBody>
+      </p:sp>
+      <p:sp>
+        <p:nvSpPr>
+          <p:cNvPr id="26" name="CuadroTexto 25">
+            <a:extLst>
+              <a:ext uri="{FF2B5EF4-FFF2-40B4-BE49-F238E27FC236}">
+                <a16:creationId xmlns:a16="http://schemas.microsoft.com/office/drawing/2014/main" id="{C6402B58-9AE2-459C-9825-2A767E75ED13}"/>
+              </a:ext>
+            </a:extLst>
+          </p:cNvPr>
+          <p:cNvSpPr txBox="1"/>
+          <p:nvPr/>
+        </p:nvSpPr>
+        <p:spPr>
+          <a:xfrm>
+            <a:off x="5099008" y="3639254"/>
+            <a:ext cx="1381340" cy="461665"/>
+          </a:xfrm>
+          <a:prstGeom prst="rect">
+            <a:avLst/>
+          </a:prstGeom>
+          <a:noFill/>
+        </p:spPr>
+        <p:txBody>
+          <a:bodyPr wrap="none" rtlCol="0">
+            <a:spAutoFit/>
+          </a:bodyPr>
+          <a:lstStyle/>
+          <a:p>
+            <a:r>
+              <a:rPr lang="ca-ES" sz="2400" b="1" dirty="0">
+                <a:solidFill>
+                  <a:srgbClr val="FF0000"/>
+                </a:solidFill>
+              </a:rPr>
+              <a:t>/cmd_vel</a:t>
+            </a:r>
+            <a:endParaRPr lang="es-ES" sz="2400" b="1" dirty="0">
+              <a:solidFill>
+                <a:srgbClr val="FF0000"/>
+              </a:solidFill>
+            </a:endParaRPr>
+          </a:p>
+        </p:txBody>
+      </p:sp>
+      <p:sp>
+        <p:nvSpPr>
+          <p:cNvPr id="27" name="CuadroTexto 26">
+            <a:extLst>
+              <a:ext uri="{FF2B5EF4-FFF2-40B4-BE49-F238E27FC236}">
+                <a16:creationId xmlns:a16="http://schemas.microsoft.com/office/drawing/2014/main" id="{CDF0E9AF-3744-422D-ADA7-52A62D6E81DF}"/>
+              </a:ext>
+            </a:extLst>
+          </p:cNvPr>
+          <p:cNvSpPr txBox="1"/>
+          <p:nvPr/>
+        </p:nvSpPr>
+        <p:spPr>
+          <a:xfrm>
+            <a:off x="4532542" y="4545370"/>
+            <a:ext cx="2310441" cy="369332"/>
+          </a:xfrm>
+          <a:prstGeom prst="rect">
+            <a:avLst/>
+          </a:prstGeom>
+          <a:noFill/>
+        </p:spPr>
+        <p:txBody>
+          <a:bodyPr wrap="none" rtlCol="0">
+            <a:spAutoFit/>
+          </a:bodyPr>
+          <a:lstStyle/>
+          <a:p>
+            <a:r>
+              <a:rPr lang="ca-ES" dirty="0"/>
+              <a:t>geometry_msgs/Twist</a:t>
+            </a:r>
+            <a:endParaRPr lang="es-ES" dirty="0"/>
+          </a:p>
+        </p:txBody>
+      </p:sp>
+      <p:sp>
+        <p:nvSpPr>
+          <p:cNvPr id="15" name="CuadroTexto 14">
+            <a:extLst>
+              <a:ext uri="{FF2B5EF4-FFF2-40B4-BE49-F238E27FC236}">
+                <a16:creationId xmlns:a16="http://schemas.microsoft.com/office/drawing/2014/main" id="{43AC39FF-DED9-4062-8E76-BF580CA6E0A5}"/>
+              </a:ext>
+            </a:extLst>
+          </p:cNvPr>
+          <p:cNvSpPr txBox="1"/>
+          <p:nvPr/>
+        </p:nvSpPr>
+        <p:spPr>
+          <a:xfrm>
+            <a:off x="7678822" y="3987114"/>
+            <a:ext cx="2073003" cy="523220"/>
+          </a:xfrm>
+          <a:prstGeom prst="rect">
+            <a:avLst/>
+          </a:prstGeom>
+          <a:noFill/>
+        </p:spPr>
+        <p:txBody>
+          <a:bodyPr wrap="none" rtlCol="0">
+            <a:spAutoFit/>
+          </a:bodyPr>
+          <a:lstStyle/>
+          <a:p>
+            <a:r>
+              <a:rPr lang="ca-ES" sz="2800" b="1" dirty="0">
+                <a:solidFill>
+                  <a:schemeClr val="accent1">
+                    <a:lumMod val="50000"/>
+                  </a:schemeClr>
+                </a:solidFill>
+              </a:rPr>
+              <a:t>/serial_node</a:t>
+            </a:r>
+            <a:endParaRPr lang="es-ES" sz="2800" b="1" dirty="0">
+              <a:solidFill>
+                <a:schemeClr val="accent1">
+                  <a:lumMod val="50000"/>
+                </a:schemeClr>
+              </a:solidFill>
+            </a:endParaRPr>
+          </a:p>
+        </p:txBody>
+      </p:sp>
+      <p:sp>
+        <p:nvSpPr>
+          <p:cNvPr id="17" name="CuadroTexto 16">
+            <a:extLst>
+              <a:ext uri="{FF2B5EF4-FFF2-40B4-BE49-F238E27FC236}">
+                <a16:creationId xmlns:a16="http://schemas.microsoft.com/office/drawing/2014/main" id="{0A5652C3-853E-4BBE-98E5-DF7984664825}"/>
+              </a:ext>
+            </a:extLst>
+          </p:cNvPr>
+          <p:cNvSpPr txBox="1"/>
+          <p:nvPr/>
+        </p:nvSpPr>
+        <p:spPr>
+          <a:xfrm>
+            <a:off x="4966424" y="1712132"/>
+            <a:ext cx="876715" cy="461665"/>
+          </a:xfrm>
+          <a:prstGeom prst="rect">
+            <a:avLst/>
+          </a:prstGeom>
+          <a:noFill/>
+        </p:spPr>
+        <p:txBody>
+          <a:bodyPr wrap="none" rtlCol="0">
+            <a:spAutoFit/>
+          </a:bodyPr>
+          <a:lstStyle/>
+          <a:p>
+            <a:r>
+              <a:rPr lang="ca-ES" sz="2400" b="1" dirty="0">
+                <a:solidFill>
+                  <a:srgbClr val="FF0000"/>
+                </a:solidFill>
+              </a:rPr>
+              <a:t>/scan</a:t>
+            </a:r>
+            <a:endParaRPr lang="es-ES" sz="2400" b="1" dirty="0">
+              <a:solidFill>
+                <a:srgbClr val="FF0000"/>
+              </a:solidFill>
+            </a:endParaRPr>
+          </a:p>
+        </p:txBody>
+      </p:sp>
+      <p:sp>
+        <p:nvSpPr>
+          <p:cNvPr id="18" name="CuadroTexto 17">
+            <a:extLst>
+              <a:ext uri="{FF2B5EF4-FFF2-40B4-BE49-F238E27FC236}">
+                <a16:creationId xmlns:a16="http://schemas.microsoft.com/office/drawing/2014/main" id="{5526D06D-79C5-4147-AA0E-5077FCD686B4}"/>
+              </a:ext>
+            </a:extLst>
+          </p:cNvPr>
+          <p:cNvSpPr txBox="1"/>
+          <p:nvPr/>
+        </p:nvSpPr>
+        <p:spPr>
+          <a:xfrm>
+            <a:off x="4027856" y="2564515"/>
+            <a:ext cx="2726516" cy="400110"/>
+          </a:xfrm>
+          <a:prstGeom prst="rect">
+            <a:avLst/>
+          </a:prstGeom>
+          <a:noFill/>
+        </p:spPr>
+        <p:txBody>
+          <a:bodyPr wrap="none" rtlCol="0">
+            <a:spAutoFit/>
+          </a:bodyPr>
+          <a:lstStyle/>
+          <a:p>
+            <a:r>
+              <a:rPr lang="ca-ES" sz="2000" dirty="0"/>
+              <a:t>sensor_msgs/LaserScan</a:t>
+            </a:r>
+            <a:endParaRPr lang="es-ES" sz="2000" dirty="0"/>
+          </a:p>
+        </p:txBody>
+      </p:sp>
+      <p:sp>
+        <p:nvSpPr>
+          <p:cNvPr id="19" name="Arco 18">
+            <a:extLst>
+              <a:ext uri="{FF2B5EF4-FFF2-40B4-BE49-F238E27FC236}">
+                <a16:creationId xmlns:a16="http://schemas.microsoft.com/office/drawing/2014/main" id="{4C67B744-A8C6-46AF-A306-09BCD63B4C2E}"/>
+              </a:ext>
+            </a:extLst>
+          </p:cNvPr>
+          <p:cNvSpPr/>
+          <p:nvPr/>
+        </p:nvSpPr>
+        <p:spPr>
+          <a:xfrm flipV="1">
+            <a:off x="3390225" y="2280748"/>
+            <a:ext cx="4905829" cy="2250421"/>
+          </a:xfrm>
+          <a:prstGeom prst="arc">
+            <a:avLst>
+              <a:gd name="adj1" fmla="val 3083598"/>
+              <a:gd name="adj2" fmla="val 10781742"/>
+            </a:avLst>
+          </a:prstGeom>
+          <a:noFill/>
+          <a:ln w="57150">
+            <a:solidFill>
+              <a:srgbClr val="FF0000"/>
+            </a:solidFill>
+            <a:headEnd type="none" w="med" len="med"/>
+            <a:tailEnd type="triangle" w="med" len="med"/>
+          </a:ln>
+        </p:spPr>
+        <p:style>
+          <a:lnRef idx="1">
+            <a:schemeClr val="accent1"/>
+          </a:lnRef>
+          <a:fillRef idx="0">
+            <a:schemeClr val="accent1"/>
+          </a:fillRef>
+          <a:effectRef idx="0">
+            <a:schemeClr val="accent1"/>
+          </a:effectRef>
+          <a:fontRef idx="minor">
+            <a:schemeClr val="tx1"/>
+          </a:fontRef>
+        </p:style>
+        <p:txBody>
+          <a:bodyPr rtlCol="0" anchor="ctr"/>
+          <a:lstStyle/>
+          <a:p>
+            <a:pPr algn="ctr"/>
+            <a:endParaRPr lang="es-ES"/>
+          </a:p>
+        </p:txBody>
+      </p:sp>
+      <p:sp>
+        <p:nvSpPr>
+          <p:cNvPr id="20" name="Elipse 19">
+            <a:extLst>
+              <a:ext uri="{FF2B5EF4-FFF2-40B4-BE49-F238E27FC236}">
+                <a16:creationId xmlns:a16="http://schemas.microsoft.com/office/drawing/2014/main" id="{DCE4CD81-C09A-4AEC-89F4-237A3D68F86D}"/>
+              </a:ext>
+            </a:extLst>
+          </p:cNvPr>
+          <p:cNvSpPr/>
+          <p:nvPr/>
+        </p:nvSpPr>
+        <p:spPr>
+          <a:xfrm>
+            <a:off x="6668216" y="1761912"/>
+            <a:ext cx="2291079" cy="1430905"/>
+          </a:xfrm>
+          <a:prstGeom prst="ellipse">
+            <a:avLst/>
+          </a:prstGeom>
+          <a:noFill/>
+          <a:ln w="38100"/>
+        </p:spPr>
+        <p:style>
+          <a:lnRef idx="2">
+            <a:schemeClr val="accent1">
+              <a:shade val="50000"/>
+            </a:schemeClr>
+          </a:lnRef>
+          <a:fillRef idx="1">
+            <a:schemeClr val="accent1"/>
+          </a:fillRef>
+          <a:effectRef idx="0">
+            <a:schemeClr val="accent1"/>
+          </a:effectRef>
+          <a:fontRef idx="minor">
+            <a:schemeClr val="lt1"/>
+          </a:fontRef>
+        </p:style>
+        <p:txBody>
+          <a:bodyPr rtlCol="0" anchor="ctr"/>
+          <a:lstStyle/>
+          <a:p>
+            <a:pPr algn="ctr"/>
+            <a:endParaRPr lang="es-ES" dirty="0"/>
+          </a:p>
+        </p:txBody>
+      </p:sp>
+      <p:sp>
+        <p:nvSpPr>
+          <p:cNvPr id="2" name="CuadroTexto 1">
+            <a:extLst>
+              <a:ext uri="{FF2B5EF4-FFF2-40B4-BE49-F238E27FC236}">
+                <a16:creationId xmlns:a16="http://schemas.microsoft.com/office/drawing/2014/main" id="{AB3A1AF0-3ED5-442C-8DF2-A8AD170DB81F}"/>
+              </a:ext>
+            </a:extLst>
+          </p:cNvPr>
+          <p:cNvSpPr txBox="1"/>
+          <p:nvPr/>
+        </p:nvSpPr>
+        <p:spPr>
+          <a:xfrm>
+            <a:off x="6893317" y="2172683"/>
+            <a:ext cx="1856598" cy="461665"/>
+          </a:xfrm>
+          <a:prstGeom prst="rect">
+            <a:avLst/>
+          </a:prstGeom>
+          <a:noFill/>
+        </p:spPr>
+        <p:txBody>
+          <a:bodyPr wrap="none" rtlCol="0">
+            <a:spAutoFit/>
+          </a:bodyPr>
+          <a:lstStyle/>
+          <a:p>
+            <a:r>
+              <a:rPr lang="ca-ES" sz="2400" b="1" dirty="0"/>
+              <a:t>/rplidarNode</a:t>
+            </a:r>
+            <a:endParaRPr lang="es-ES" sz="2400" b="1" dirty="0"/>
+          </a:p>
+        </p:txBody>
+      </p:sp>
+      <p:sp>
+        <p:nvSpPr>
+          <p:cNvPr id="21" name="CuadroTexto 20">
+            <a:extLst>
+              <a:ext uri="{FF2B5EF4-FFF2-40B4-BE49-F238E27FC236}">
+                <a16:creationId xmlns:a16="http://schemas.microsoft.com/office/drawing/2014/main" id="{C5051B2E-AB43-47B5-A1F6-3DA219C8F200}"/>
+              </a:ext>
+            </a:extLst>
+          </p:cNvPr>
+          <p:cNvSpPr txBox="1"/>
+          <p:nvPr/>
+        </p:nvSpPr>
+        <p:spPr>
+          <a:xfrm>
+            <a:off x="9121130" y="2203696"/>
+            <a:ext cx="987771" cy="523220"/>
+          </a:xfrm>
+          <a:prstGeom prst="rect">
+            <a:avLst/>
+          </a:prstGeom>
+          <a:noFill/>
+        </p:spPr>
+        <p:txBody>
+          <a:bodyPr wrap="none" rtlCol="0">
+            <a:spAutoFit/>
+          </a:bodyPr>
+          <a:lstStyle/>
+          <a:p>
+            <a:r>
+              <a:rPr lang="ca-ES" sz="2800" b="1" dirty="0"/>
+              <a:t>Node</a:t>
+            </a:r>
+            <a:endParaRPr lang="es-ES" sz="2800" b="1" dirty="0"/>
+          </a:p>
+        </p:txBody>
+      </p:sp>
+      <p:sp>
+        <p:nvSpPr>
+          <p:cNvPr id="22" name="Elipse 21">
+            <a:extLst>
+              <a:ext uri="{FF2B5EF4-FFF2-40B4-BE49-F238E27FC236}">
+                <a16:creationId xmlns:a16="http://schemas.microsoft.com/office/drawing/2014/main" id="{287632C9-86C9-4E3B-B8AF-6B50E08FB857}"/>
+              </a:ext>
+            </a:extLst>
+          </p:cNvPr>
+          <p:cNvSpPr/>
+          <p:nvPr/>
+        </p:nvSpPr>
+        <p:spPr>
+          <a:xfrm>
+            <a:off x="6700955" y="92973"/>
+            <a:ext cx="2291079" cy="1430905"/>
+          </a:xfrm>
+          <a:prstGeom prst="ellipse">
+            <a:avLst/>
+          </a:prstGeom>
+          <a:noFill/>
+          <a:ln w="38100"/>
+        </p:spPr>
+        <p:style>
+          <a:lnRef idx="2">
+            <a:schemeClr val="accent1">
+              <a:shade val="50000"/>
+            </a:schemeClr>
+          </a:lnRef>
+          <a:fillRef idx="1">
+            <a:schemeClr val="accent1"/>
+          </a:fillRef>
+          <a:effectRef idx="0">
+            <a:schemeClr val="accent1"/>
+          </a:effectRef>
+          <a:fontRef idx="minor">
+            <a:schemeClr val="lt1"/>
+          </a:fontRef>
+        </p:style>
+        <p:txBody>
+          <a:bodyPr rtlCol="0" anchor="ctr"/>
+          <a:lstStyle/>
+          <a:p>
+            <a:pPr algn="ctr"/>
+            <a:endParaRPr lang="es-ES" dirty="0"/>
+          </a:p>
+        </p:txBody>
+      </p:sp>
+      <p:sp>
+        <p:nvSpPr>
+          <p:cNvPr id="28" name="CuadroTexto 27">
+            <a:extLst>
+              <a:ext uri="{FF2B5EF4-FFF2-40B4-BE49-F238E27FC236}">
+                <a16:creationId xmlns:a16="http://schemas.microsoft.com/office/drawing/2014/main" id="{C7B3A669-0D52-43CF-BFD3-9E36671C979A}"/>
+              </a:ext>
+            </a:extLst>
+          </p:cNvPr>
+          <p:cNvSpPr txBox="1"/>
+          <p:nvPr/>
+        </p:nvSpPr>
+        <p:spPr>
+          <a:xfrm>
+            <a:off x="7131662" y="494379"/>
+            <a:ext cx="1454052" cy="461665"/>
+          </a:xfrm>
+          <a:prstGeom prst="rect">
+            <a:avLst/>
+          </a:prstGeom>
+          <a:noFill/>
+        </p:spPr>
+        <p:txBody>
+          <a:bodyPr wrap="none" rtlCol="0">
+            <a:spAutoFit/>
+          </a:bodyPr>
+          <a:lstStyle/>
+          <a:p>
+            <a:r>
+              <a:rPr lang="ca-ES" sz="2400" b="1" dirty="0"/>
+              <a:t>/usb_cam</a:t>
+            </a:r>
+            <a:endParaRPr lang="es-ES" sz="2400" b="1" dirty="0"/>
+          </a:p>
+        </p:txBody>
+      </p:sp>
+      <p:sp>
+        <p:nvSpPr>
+          <p:cNvPr id="29" name="CuadroTexto 28">
+            <a:extLst>
+              <a:ext uri="{FF2B5EF4-FFF2-40B4-BE49-F238E27FC236}">
+                <a16:creationId xmlns:a16="http://schemas.microsoft.com/office/drawing/2014/main" id="{446F2EA0-6672-48AA-AB7C-46254754C3AC}"/>
+              </a:ext>
+            </a:extLst>
+          </p:cNvPr>
+          <p:cNvSpPr txBox="1"/>
+          <p:nvPr/>
+        </p:nvSpPr>
+        <p:spPr>
+          <a:xfrm>
+            <a:off x="9172961" y="578776"/>
+            <a:ext cx="987771" cy="523220"/>
+          </a:xfrm>
+          <a:prstGeom prst="rect">
+            <a:avLst/>
+          </a:prstGeom>
+          <a:noFill/>
+        </p:spPr>
+        <p:txBody>
+          <a:bodyPr wrap="none" rtlCol="0">
+            <a:spAutoFit/>
+          </a:bodyPr>
+          <a:lstStyle/>
+          <a:p>
+            <a:r>
+              <a:rPr lang="ca-ES" sz="2800" b="1" dirty="0"/>
+              <a:t>Node</a:t>
+            </a:r>
+            <a:endParaRPr lang="es-ES" sz="2800" b="1" dirty="0"/>
+          </a:p>
+        </p:txBody>
+      </p:sp>
+      <p:sp>
+        <p:nvSpPr>
+          <p:cNvPr id="30" name="CuadroTexto 29">
+            <a:extLst>
+              <a:ext uri="{FF2B5EF4-FFF2-40B4-BE49-F238E27FC236}">
+                <a16:creationId xmlns:a16="http://schemas.microsoft.com/office/drawing/2014/main" id="{E0806900-E02C-4F19-9DF4-14F27003E0A9}"/>
+              </a:ext>
+            </a:extLst>
+          </p:cNvPr>
+          <p:cNvSpPr txBox="1"/>
+          <p:nvPr/>
+        </p:nvSpPr>
+        <p:spPr>
+          <a:xfrm>
+            <a:off x="3612426" y="186848"/>
+            <a:ext cx="2998065" cy="461665"/>
+          </a:xfrm>
+          <a:prstGeom prst="rect">
+            <a:avLst/>
+          </a:prstGeom>
+          <a:noFill/>
+        </p:spPr>
+        <p:txBody>
+          <a:bodyPr wrap="none" rtlCol="0">
+            <a:spAutoFit/>
+          </a:bodyPr>
+          <a:lstStyle/>
+          <a:p>
+            <a:r>
+              <a:rPr lang="ca-ES" sz="2400" b="1" dirty="0">
+                <a:solidFill>
+                  <a:srgbClr val="FF0000"/>
+                </a:solidFill>
+              </a:rPr>
+              <a:t>/usb_cam/image_raw</a:t>
+            </a:r>
+            <a:endParaRPr lang="es-ES" sz="2400" b="1" dirty="0">
+              <a:solidFill>
+                <a:srgbClr val="FF0000"/>
+              </a:solidFill>
+            </a:endParaRPr>
+          </a:p>
+        </p:txBody>
+      </p:sp>
+      <p:sp>
+        <p:nvSpPr>
+          <p:cNvPr id="31" name="CuadroTexto 30">
+            <a:extLst>
+              <a:ext uri="{FF2B5EF4-FFF2-40B4-BE49-F238E27FC236}">
+                <a16:creationId xmlns:a16="http://schemas.microsoft.com/office/drawing/2014/main" id="{A5C2C63E-D55D-4C7A-9653-D20F4FAA4E3E}"/>
+              </a:ext>
+            </a:extLst>
+          </p:cNvPr>
+          <p:cNvSpPr txBox="1"/>
+          <p:nvPr/>
+        </p:nvSpPr>
+        <p:spPr>
+          <a:xfrm>
+            <a:off x="4553733" y="1009018"/>
+            <a:ext cx="2268057" cy="400110"/>
+          </a:xfrm>
+          <a:prstGeom prst="rect">
+            <a:avLst/>
+          </a:prstGeom>
+          <a:noFill/>
+        </p:spPr>
+        <p:txBody>
+          <a:bodyPr wrap="none" rtlCol="0">
+            <a:spAutoFit/>
+          </a:bodyPr>
+          <a:lstStyle/>
+          <a:p>
+            <a:r>
+              <a:rPr lang="ca-ES" sz="2000" dirty="0"/>
+              <a:t>sensor_msgs/Image</a:t>
+            </a:r>
+            <a:endParaRPr lang="es-ES" sz="2000" dirty="0"/>
+          </a:p>
+        </p:txBody>
+      </p:sp>
+      <p:sp>
+        <p:nvSpPr>
+          <p:cNvPr id="32" name="Arco 31">
+            <a:extLst>
+              <a:ext uri="{FF2B5EF4-FFF2-40B4-BE49-F238E27FC236}">
+                <a16:creationId xmlns:a16="http://schemas.microsoft.com/office/drawing/2014/main" id="{FE6BBB4D-293B-4F9C-AE38-FE43E7060468}"/>
+              </a:ext>
+            </a:extLst>
+          </p:cNvPr>
+          <p:cNvSpPr/>
+          <p:nvPr/>
+        </p:nvSpPr>
+        <p:spPr>
+          <a:xfrm flipV="1">
+            <a:off x="2978093" y="725212"/>
+            <a:ext cx="6914906" cy="5066507"/>
+          </a:xfrm>
+          <a:prstGeom prst="arc">
+            <a:avLst>
+              <a:gd name="adj1" fmla="val 5013535"/>
+              <a:gd name="adj2" fmla="val 10913513"/>
+            </a:avLst>
+          </a:prstGeom>
+          <a:noFill/>
+          <a:ln w="57150">
+            <a:solidFill>
+              <a:srgbClr val="FF0000"/>
+            </a:solidFill>
+            <a:headEnd type="none" w="med" len="med"/>
+            <a:tailEnd type="triangle" w="med" len="med"/>
+          </a:ln>
+        </p:spPr>
+        <p:style>
+          <a:lnRef idx="1">
+            <a:schemeClr val="accent1"/>
+          </a:lnRef>
+          <a:fillRef idx="0">
+            <a:schemeClr val="accent1"/>
+          </a:fillRef>
+          <a:effectRef idx="0">
+            <a:schemeClr val="accent1"/>
+          </a:effectRef>
+          <a:fontRef idx="minor">
+            <a:schemeClr val="tx1"/>
+          </a:fontRef>
+        </p:style>
+        <p:txBody>
+          <a:bodyPr rtlCol="0" anchor="ctr"/>
+          <a:lstStyle/>
+          <a:p>
+            <a:pPr algn="ctr"/>
+            <a:endParaRPr lang="es-ES"/>
+          </a:p>
+        </p:txBody>
+      </p:sp>
       <p:pic>
         <p:nvPicPr>
-          <p:cNvPr id="2" name="Picture 1">
-            <a:extLst>
-              <a:ext uri="{FF2B5EF4-FFF2-40B4-BE49-F238E27FC236}">
-                <a16:creationId xmlns:a16="http://schemas.microsoft.com/office/drawing/2014/main" id="{D5C28000-9400-D594-1C16-C516F0A4E7B6}"/>
+          <p:cNvPr id="44" name="Imagen 43">
+            <a:extLst>
+              <a:ext uri="{FF2B5EF4-FFF2-40B4-BE49-F238E27FC236}">
+                <a16:creationId xmlns:a16="http://schemas.microsoft.com/office/drawing/2014/main" id="{1BED6E31-E310-4A27-AC61-4A92A894767E}"/>
               </a:ext>
             </a:extLst>
           </p:cNvPr>
@@ -8106,8 +8617,8 @@
         </p:blipFill>
         <p:spPr>
           <a:xfrm>
-            <a:off x="812800" y="618067"/>
-            <a:ext cx="4572000" cy="4572000"/>
+            <a:off x="8188983" y="5596196"/>
+            <a:ext cx="1739040" cy="949516"/>
           </a:xfrm>
           <a:prstGeom prst="rect">
             <a:avLst/>
@@ -8116,10 +8627,57 @@
       </p:pic>
       <p:pic>
         <p:nvPicPr>
-          <p:cNvPr id="3" name="Picture 2">
-            <a:extLst>
-              <a:ext uri="{FF2B5EF4-FFF2-40B4-BE49-F238E27FC236}">
-                <a16:creationId xmlns:a16="http://schemas.microsoft.com/office/drawing/2014/main" id="{BAE887E4-4F3A-65A2-6BB4-D797AD40644A}"/>
+          <p:cNvPr id="1026" name="Picture 2" descr="RPI5-4GB-SINGLE Raspberry-pi, SBC, Raspberry Pi5 4GB, BCM2712 | Farnell ES">
+            <a:extLst>
+              <a:ext uri="{FF2B5EF4-FFF2-40B4-BE49-F238E27FC236}">
+                <a16:creationId xmlns:a16="http://schemas.microsoft.com/office/drawing/2014/main" id="{E5723E90-B6CD-0D7A-27DB-34F48CE8B580}"/>
+              </a:ext>
+            </a:extLst>
+          </p:cNvPr>
+          <p:cNvPicPr>
+            <a:picLocks noChangeAspect="1" noChangeArrowheads="1"/>
+          </p:cNvPicPr>
+          <p:nvPr/>
+        </p:nvPicPr>
+        <p:blipFill>
+          <a:blip r:embed="rId3">
+            <a:extLst>
+              <a:ext uri="{28A0092B-C50C-407E-A947-70E740481C1C}">
+                <a14:useLocalDpi xmlns:a14="http://schemas.microsoft.com/office/drawing/2010/main" val="0"/>
+              </a:ext>
+            </a:extLst>
+          </a:blip>
+          <a:srcRect/>
+          <a:stretch>
+            <a:fillRect/>
+          </a:stretch>
+        </p:blipFill>
+        <p:spPr bwMode="auto">
+          <a:xfrm>
+            <a:off x="1207045" y="5250518"/>
+            <a:ext cx="2034451" cy="1544067"/>
+          </a:xfrm>
+          <a:prstGeom prst="rect">
+            <a:avLst/>
+          </a:prstGeom>
+          <a:noFill/>
+          <a:extLst>
+            <a:ext uri="{909E8E84-426E-40DD-AFC4-6F175D3DCCD1}">
+              <a14:hiddenFill xmlns:a14="http://schemas.microsoft.com/office/drawing/2010/main">
+                <a:solidFill>
+                  <a:srgbClr val="FFFFFF"/>
+                </a:solidFill>
+              </a14:hiddenFill>
+            </a:ext>
+          </a:extLst>
+        </p:spPr>
+      </p:pic>
+      <p:pic>
+        <p:nvPicPr>
+          <p:cNvPr id="5" name="Picture 4">
+            <a:extLst>
+              <a:ext uri="{FF2B5EF4-FFF2-40B4-BE49-F238E27FC236}">
+                <a16:creationId xmlns:a16="http://schemas.microsoft.com/office/drawing/2014/main" id="{A5A6F755-F1D0-1D51-C370-7C59AD5CDE8E}"/>
               </a:ext>
             </a:extLst>
           </p:cNvPr>
@@ -8128,15 +8686,16 @@
           </p:cNvPicPr>
           <p:nvPr/>
         </p:nvPicPr>
-        <p:blipFill rotWithShape="1">
-          <a:blip r:embed="rId2"/>
-          <a:srcRect l="11637" t="54557" r="7573" b="2977"/>
-          <a:stretch/>
+        <p:blipFill>
+          <a:blip r:embed="rId4"/>
+          <a:stretch>
+            <a:fillRect/>
+          </a:stretch>
         </p:blipFill>
         <p:spPr>
           <a:xfrm>
-            <a:off x="7339263" y="3248526"/>
-            <a:ext cx="3693696" cy="1941541"/>
+            <a:off x="8560532" y="5300420"/>
+            <a:ext cx="2073003" cy="899078"/>
           </a:xfrm>
           <a:prstGeom prst="rect">
             <a:avLst/>
@@ -8146,7 +8705,7 @@
     </p:spTree>
     <p:extLst>
       <p:ext uri="{BB962C8B-B14F-4D97-AF65-F5344CB8AC3E}">
-        <p14:creationId xmlns:p14="http://schemas.microsoft.com/office/powerpoint/2010/main" val="2816021084"/>
+        <p14:creationId xmlns:p14="http://schemas.microsoft.com/office/powerpoint/2010/main" val="2967436431"/>
       </p:ext>
     </p:extLst>
   </p:cSld>
@@ -8173,35 +8732,6 @@
           <a:chExt cx="0" cy="0"/>
         </a:xfrm>
       </p:grpSpPr>
-      <p:pic>
-        <p:nvPicPr>
-          <p:cNvPr id="3" name="Picture 2">
-            <a:extLst>
-              <a:ext uri="{FF2B5EF4-FFF2-40B4-BE49-F238E27FC236}">
-                <a16:creationId xmlns:a16="http://schemas.microsoft.com/office/drawing/2014/main" id="{0578D19B-E215-BAE6-5AB5-A674798648E2}"/>
-              </a:ext>
-            </a:extLst>
-          </p:cNvPr>
-          <p:cNvPicPr>
-            <a:picLocks noChangeAspect="1"/>
-          </p:cNvPicPr>
-          <p:nvPr/>
-        </p:nvPicPr>
-        <p:blipFill rotWithShape="1">
-          <a:blip r:embed="rId2"/>
-          <a:srcRect l="11637" t="54557" r="7573" b="2977"/>
-          <a:stretch/>
-        </p:blipFill>
-        <p:spPr>
-          <a:xfrm>
-            <a:off x="1414653" y="5259866"/>
-            <a:ext cx="2023652" cy="1063705"/>
-          </a:xfrm>
-          <a:prstGeom prst="rect">
-            <a:avLst/>
-          </a:prstGeom>
-        </p:spPr>
-      </p:pic>
       <p:cxnSp>
         <p:nvCxnSpPr>
           <p:cNvPr id="7" name="Conector recto de flecha 6">
@@ -9201,10 +9731,57 @@
       </p:sp>
       <p:pic>
         <p:nvPicPr>
-          <p:cNvPr id="44" name="Imagen 43">
-            <a:extLst>
-              <a:ext uri="{FF2B5EF4-FFF2-40B4-BE49-F238E27FC236}">
-                <a16:creationId xmlns:a16="http://schemas.microsoft.com/office/drawing/2014/main" id="{1BED6E31-E310-4A27-AC61-4A92A894767E}"/>
+          <p:cNvPr id="1026" name="Picture 2" descr="RPI5-4GB-SINGLE Raspberry-pi, SBC, Raspberry Pi5 4GB, BCM2712 | Farnell ES">
+            <a:extLst>
+              <a:ext uri="{FF2B5EF4-FFF2-40B4-BE49-F238E27FC236}">
+                <a16:creationId xmlns:a16="http://schemas.microsoft.com/office/drawing/2014/main" id="{E5723E90-B6CD-0D7A-27DB-34F48CE8B580}"/>
+              </a:ext>
+            </a:extLst>
+          </p:cNvPr>
+          <p:cNvPicPr>
+            <a:picLocks noChangeAspect="1" noChangeArrowheads="1"/>
+          </p:cNvPicPr>
+          <p:nvPr/>
+        </p:nvPicPr>
+        <p:blipFill>
+          <a:blip r:embed="rId2">
+            <a:extLst>
+              <a:ext uri="{28A0092B-C50C-407E-A947-70E740481C1C}">
+                <a14:useLocalDpi xmlns:a14="http://schemas.microsoft.com/office/drawing/2010/main" val="0"/>
+              </a:ext>
+            </a:extLst>
+          </a:blip>
+          <a:srcRect/>
+          <a:stretch>
+            <a:fillRect/>
+          </a:stretch>
+        </p:blipFill>
+        <p:spPr bwMode="auto">
+          <a:xfrm>
+            <a:off x="1207045" y="5250518"/>
+            <a:ext cx="2034451" cy="1544067"/>
+          </a:xfrm>
+          <a:prstGeom prst="rect">
+            <a:avLst/>
+          </a:prstGeom>
+          <a:noFill/>
+          <a:extLst>
+            <a:ext uri="{909E8E84-426E-40DD-AFC4-6F175D3DCCD1}">
+              <a14:hiddenFill xmlns:a14="http://schemas.microsoft.com/office/drawing/2010/main">
+                <a:solidFill>
+                  <a:srgbClr val="FFFFFF"/>
+                </a:solidFill>
+              </a14:hiddenFill>
+            </a:ext>
+          </a:extLst>
+        </p:spPr>
+      </p:pic>
+      <p:pic>
+        <p:nvPicPr>
+          <p:cNvPr id="3" name="Imagen 1">
+            <a:extLst>
+              <a:ext uri="{FF2B5EF4-FFF2-40B4-BE49-F238E27FC236}">
+                <a16:creationId xmlns:a16="http://schemas.microsoft.com/office/drawing/2014/main" id="{88261E28-56A3-06E9-5705-7610EE239AED}"/>
               </a:ext>
             </a:extLst>
           </p:cNvPr>
@@ -9213,26 +9790,104 @@
           </p:cNvPicPr>
           <p:nvPr/>
         </p:nvPicPr>
-        <p:blipFill>
-          <a:blip r:embed="rId3"/>
-          <a:stretch>
-            <a:fillRect/>
-          </a:stretch>
+        <p:blipFill rotWithShape="1">
+          <a:blip r:embed="rId3" cstate="print">
+            <a:extLst>
+              <a:ext uri="{28A0092B-C50C-407E-A947-70E740481C1C}">
+                <a14:useLocalDpi xmlns:a14="http://schemas.microsoft.com/office/drawing/2010/main" val="0"/>
+              </a:ext>
+            </a:extLst>
+          </a:blip>
+          <a:srcRect l="7788" t="5117" r="11908" b="9546"/>
+          <a:stretch/>
         </p:blipFill>
-        <p:spPr>
-          <a:xfrm>
-            <a:off x="8496043" y="5433071"/>
-            <a:ext cx="1739040" cy="949516"/>
+        <p:spPr bwMode="auto">
+          <a:xfrm rot="16200000">
+            <a:off x="8647049" y="5068790"/>
+            <a:ext cx="1301160" cy="1845281"/>
           </a:xfrm>
           <a:prstGeom prst="rect">
             <a:avLst/>
           </a:prstGeom>
+          <a:noFill/>
+          <a:ln>
+            <a:noFill/>
+          </a:ln>
         </p:spPr>
       </p:pic>
     </p:spTree>
     <p:extLst>
       <p:ext uri="{BB962C8B-B14F-4D97-AF65-F5344CB8AC3E}">
-        <p14:creationId xmlns:p14="http://schemas.microsoft.com/office/powerpoint/2010/main" val="2967436431"/>
+        <p14:creationId xmlns:p14="http://schemas.microsoft.com/office/powerpoint/2010/main" val="1491260210"/>
+      </p:ext>
+    </p:extLst>
+  </p:cSld>
+  <p:clrMapOvr>
+    <a:masterClrMapping/>
+  </p:clrMapOvr>
+</p:sld>
+</file>
+
+<file path=ppt/slides/slide8.xml><?xml version="1.0" encoding="utf-8"?>
+<p:sld xmlns:a="http://schemas.openxmlformats.org/drawingml/2006/main" xmlns:r="http://schemas.openxmlformats.org/officeDocument/2006/relationships" xmlns:p="http://schemas.openxmlformats.org/presentationml/2006/main">
+  <p:cSld>
+    <p:spTree>
+      <p:nvGrpSpPr>
+        <p:cNvPr id="1" name=""/>
+        <p:cNvGrpSpPr/>
+        <p:nvPr/>
+      </p:nvGrpSpPr>
+      <p:grpSpPr>
+        <a:xfrm>
+          <a:off x="0" y="0"/>
+          <a:ext cx="0" cy="0"/>
+          <a:chOff x="0" y="0"/>
+          <a:chExt cx="0" cy="0"/>
+        </a:xfrm>
+      </p:grpSpPr>
+      <p:pic>
+        <p:nvPicPr>
+          <p:cNvPr id="2" name="Imagen 1">
+            <a:extLst>
+              <a:ext uri="{FF2B5EF4-FFF2-40B4-BE49-F238E27FC236}">
+                <a16:creationId xmlns:a16="http://schemas.microsoft.com/office/drawing/2014/main" id="{1C6C064B-11A1-536B-3012-AD2DECC9F057}"/>
+              </a:ext>
+            </a:extLst>
+          </p:cNvPr>
+          <p:cNvPicPr>
+            <a:picLocks noChangeAspect="1"/>
+          </p:cNvPicPr>
+          <p:nvPr/>
+        </p:nvPicPr>
+        <p:blipFill rotWithShape="1">
+          <a:blip r:embed="rId2" cstate="print">
+            <a:extLst>
+              <a:ext uri="{28A0092B-C50C-407E-A947-70E740481C1C}">
+                <a14:useLocalDpi xmlns:a14="http://schemas.microsoft.com/office/drawing/2010/main" val="0"/>
+              </a:ext>
+            </a:extLst>
+          </a:blip>
+          <a:srcRect l="7788" t="5117" r="11908" b="9546"/>
+          <a:stretch/>
+        </p:blipFill>
+        <p:spPr bwMode="auto">
+          <a:xfrm>
+            <a:off x="9116008" y="3474755"/>
+            <a:ext cx="1884225" cy="2672173"/>
+          </a:xfrm>
+          <a:prstGeom prst="rect">
+            <a:avLst/>
+          </a:prstGeom>
+          <a:noFill/>
+          <a:ln>
+            <a:noFill/>
+          </a:ln>
+        </p:spPr>
+      </p:pic>
+    </p:spTree>
+    <p:extLst>
+      <p:ext uri="{BB962C8B-B14F-4D97-AF65-F5344CB8AC3E}">
+        <p14:creationId xmlns:p14="http://schemas.microsoft.com/office/powerpoint/2010/main" val="2212610362"/>
       </p:ext>
     </p:extLst>
   </p:cSld>

</xml_diff>